<commit_message>
updated 03 slides created placeholder ppt for 04
</commit_message>
<xml_diff>
--- a/connect2016/developer/03/03.pptx
+++ b/connect2016/developer/03/03.pptx
@@ -6,17 +6,21 @@
     <p:sldMasterId id="2147483684" r:id="rId2"/>
   </p:sldMasterIdLst>
   <p:notesMasterIdLst>
-    <p:notesMasterId r:id="rId8"/>
+    <p:notesMasterId r:id="rId12"/>
   </p:notesMasterIdLst>
   <p:handoutMasterIdLst>
-    <p:handoutMasterId r:id="rId9"/>
+    <p:handoutMasterId r:id="rId13"/>
   </p:handoutMasterIdLst>
   <p:sldIdLst>
     <p:sldId id="444" r:id="rId3"/>
     <p:sldId id="445" r:id="rId4"/>
     <p:sldId id="496" r:id="rId5"/>
     <p:sldId id="494" r:id="rId6"/>
-    <p:sldId id="484" r:id="rId7"/>
+    <p:sldId id="500" r:id="rId7"/>
+    <p:sldId id="497" r:id="rId8"/>
+    <p:sldId id="498" r:id="rId9"/>
+    <p:sldId id="499" r:id="rId10"/>
+    <p:sldId id="484" r:id="rId11"/>
   </p:sldIdLst>
   <p:sldSz cx="9144000" cy="5143500" type="screen16x9"/>
   <p:notesSz cx="6858000" cy="9144000"/>
@@ -124,6 +128,10 @@
             <p14:sldId id="445"/>
             <p14:sldId id="496"/>
             <p14:sldId id="494"/>
+            <p14:sldId id="500"/>
+            <p14:sldId id="497"/>
+            <p14:sldId id="498"/>
+            <p14:sldId id="499"/>
             <p14:sldId id="484"/>
           </p14:sldIdLst>
         </p14:section>
@@ -253,7 +261,7 @@
           <a:p>
             <a:fld id="{B5389E1E-C654-E943-9883-792E99AD7287}" type="datetimeFigureOut">
               <a:rPr lang="en-US" smtClean="0"/>
-              <a:t>9/22/2016</a:t>
+              <a:t>10/19/2016</a:t>
             </a:fld>
             <a:endParaRPr lang="en-US"/>
           </a:p>
@@ -419,7 +427,7 @@
           <a:p>
             <a:fld id="{9920D99B-2862-464A-984E-65BFC5FC0BBC}" type="datetimeFigureOut">
               <a:rPr lang="en-US" smtClean="0"/>
-              <a:t>9/22/2016</a:t>
+              <a:t>10/19/2016</a:t>
             </a:fld>
             <a:endParaRPr lang="en-US"/>
           </a:p>
@@ -6764,7 +6772,7 @@
             </a:pPr>
             <a:r>
               <a:rPr lang="en-US" dirty="0"/>
-              <a:t>Java - ?</a:t>
+              <a:t>Java - Spring</a:t>
             </a:r>
           </a:p>
           <a:p>
@@ -6806,7 +6814,7 @@
             </a:pPr>
             <a:r>
               <a:rPr lang="en-US" dirty="0"/>
-              <a:t>Angular2 (UI)</a:t>
+              <a:t>Angular 2 (UI)</a:t>
             </a:r>
           </a:p>
           <a:p>
@@ -7149,7 +7157,7 @@
             </a:pPr>
             <a:r>
               <a:rPr lang="en-US" dirty="0"/>
-              <a:t>The “lab” branch is also available on USB sticks</a:t>
+              <a:t>The source code is also available on USB sticks</a:t>
             </a:r>
           </a:p>
           <a:p>
@@ -7158,21 +7166,6 @@
               <a:buChar char="•"/>
             </a:pPr>
             <a:endParaRPr lang="en-US" b="1" dirty="0"/>
-          </a:p>
-          <a:p>
-            <a:pPr marL="342900" indent="-342900">
-              <a:buFont typeface="Arial" charset="0"/>
-              <a:buChar char="•"/>
-            </a:pPr>
-            <a:r>
-              <a:rPr lang="en-US" dirty="0"/>
-              <a:t>The completed lab source code is also available on </a:t>
-            </a:r>
-            <a:r>
-              <a:rPr lang="en-US" dirty="0" err="1"/>
-              <a:t>Github</a:t>
-            </a:r>
-            <a:endParaRPr lang="en-US" dirty="0"/>
           </a:p>
           <a:p>
             <a:endParaRPr lang="en-US" dirty="0"/>
@@ -7193,6 +7186,328 @@
 </file>
 
 <file path=ppt/slides/slide5.xml><?xml version="1.0" encoding="utf-8"?>
+<p:sld xmlns:a="http://schemas.openxmlformats.org/drawingml/2006/main" xmlns:r="http://schemas.openxmlformats.org/officeDocument/2006/relationships" xmlns:p="http://schemas.openxmlformats.org/presentationml/2006/main">
+  <p:cSld>
+    <p:spTree>
+      <p:nvGrpSpPr>
+        <p:cNvPr id="1" name=""/>
+        <p:cNvGrpSpPr/>
+        <p:nvPr/>
+      </p:nvGrpSpPr>
+      <p:grpSpPr>
+        <a:xfrm>
+          <a:off x="0" y="0"/>
+          <a:ext cx="0" cy="0"/>
+          <a:chOff x="0" y="0"/>
+          <a:chExt cx="0" cy="0"/>
+        </a:xfrm>
+      </p:grpSpPr>
+      <p:sp>
+        <p:nvSpPr>
+          <p:cNvPr id="2" name="Title 1"/>
+          <p:cNvSpPr>
+            <a:spLocks noGrp="1"/>
+          </p:cNvSpPr>
+          <p:nvPr>
+            <p:ph type="title"/>
+          </p:nvPr>
+        </p:nvSpPr>
+        <p:spPr/>
+        <p:txBody>
+          <a:bodyPr/>
+          <a:lstStyle/>
+          <a:p>
+            <a:r>
+              <a:rPr lang="en-US" dirty="0"/>
+              <a:t>Exercise: Getting Started</a:t>
+            </a:r>
+          </a:p>
+        </p:txBody>
+      </p:sp>
+      <p:sp>
+        <p:nvSpPr>
+          <p:cNvPr id="3" name="Content Placeholder 2"/>
+          <p:cNvSpPr>
+            <a:spLocks noGrp="1"/>
+          </p:cNvSpPr>
+          <p:nvPr>
+            <p:ph idx="1"/>
+          </p:nvPr>
+        </p:nvSpPr>
+        <p:spPr/>
+        <p:txBody>
+          <a:bodyPr/>
+          <a:lstStyle/>
+          <a:p>
+            <a:r>
+              <a:rPr lang="en-US" dirty="0"/>
+              <a:t>We’re going to fill in one of the blanks together, one for each language/platform.</a:t>
+            </a:r>
+          </a:p>
+          <a:p>
+            <a:endParaRPr lang="en-US" dirty="0"/>
+          </a:p>
+          <a:p>
+            <a:r>
+              <a:rPr lang="en-US" dirty="0"/>
+              <a:t>The rest of the them are up to you.</a:t>
+            </a:r>
+          </a:p>
+          <a:p>
+            <a:endParaRPr lang="en-US" dirty="0"/>
+          </a:p>
+          <a:p>
+            <a:r>
+              <a:rPr lang="en-US" dirty="0"/>
+              <a:t>If you have questions or are running into a problem, we’ll be walking around helping you individually.</a:t>
+            </a:r>
+          </a:p>
+        </p:txBody>
+      </p:sp>
+    </p:spTree>
+    <p:extLst>
+      <p:ext uri="{BB962C8B-B14F-4D97-AF65-F5344CB8AC3E}">
+        <p14:creationId xmlns:p14="http://schemas.microsoft.com/office/powerpoint/2010/main" val="3024447773"/>
+      </p:ext>
+    </p:extLst>
+  </p:cSld>
+  <p:clrMapOvr>
+    <a:masterClrMapping/>
+  </p:clrMapOvr>
+</p:sld>
+</file>
+
+<file path=ppt/slides/slide6.xml><?xml version="1.0" encoding="utf-8"?>
+<p:sld xmlns:a="http://schemas.openxmlformats.org/drawingml/2006/main" xmlns:r="http://schemas.openxmlformats.org/officeDocument/2006/relationships" xmlns:p="http://schemas.openxmlformats.org/presentationml/2006/main">
+  <p:cSld>
+    <p:spTree>
+      <p:nvGrpSpPr>
+        <p:cNvPr id="1" name=""/>
+        <p:cNvGrpSpPr/>
+        <p:nvPr/>
+      </p:nvGrpSpPr>
+      <p:grpSpPr>
+        <a:xfrm>
+          <a:off x="0" y="0"/>
+          <a:ext cx="0" cy="0"/>
+          <a:chOff x="0" y="0"/>
+          <a:chExt cx="0" cy="0"/>
+        </a:xfrm>
+      </p:grpSpPr>
+      <p:sp>
+        <p:nvSpPr>
+          <p:cNvPr id="2" name="Title 1"/>
+          <p:cNvSpPr>
+            <a:spLocks noGrp="1"/>
+          </p:cNvSpPr>
+          <p:nvPr>
+            <p:ph type="title"/>
+          </p:nvPr>
+        </p:nvSpPr>
+        <p:spPr/>
+        <p:txBody>
+          <a:bodyPr/>
+          <a:lstStyle/>
+          <a:p>
+            <a:r>
+              <a:rPr lang="en-US" dirty="0"/>
+              <a:t>Java</a:t>
+            </a:r>
+          </a:p>
+        </p:txBody>
+      </p:sp>
+      <p:sp>
+        <p:nvSpPr>
+          <p:cNvPr id="3" name="Content Placeholder 2"/>
+          <p:cNvSpPr>
+            <a:spLocks noGrp="1"/>
+          </p:cNvSpPr>
+          <p:nvPr>
+            <p:ph idx="1"/>
+          </p:nvPr>
+        </p:nvSpPr>
+        <p:spPr/>
+        <p:txBody>
+          <a:bodyPr/>
+          <a:lstStyle/>
+          <a:p>
+            <a:r>
+              <a:rPr lang="en-US" dirty="0"/>
+              <a:t>[java example here]</a:t>
+            </a:r>
+          </a:p>
+        </p:txBody>
+      </p:sp>
+    </p:spTree>
+    <p:extLst>
+      <p:ext uri="{BB962C8B-B14F-4D97-AF65-F5344CB8AC3E}">
+        <p14:creationId xmlns:p14="http://schemas.microsoft.com/office/powerpoint/2010/main" val="3978316419"/>
+      </p:ext>
+    </p:extLst>
+  </p:cSld>
+  <p:clrMapOvr>
+    <a:masterClrMapping/>
+  </p:clrMapOvr>
+</p:sld>
+</file>
+
+<file path=ppt/slides/slide7.xml><?xml version="1.0" encoding="utf-8"?>
+<p:sld xmlns:a="http://schemas.openxmlformats.org/drawingml/2006/main" xmlns:r="http://schemas.openxmlformats.org/officeDocument/2006/relationships" xmlns:p="http://schemas.openxmlformats.org/presentationml/2006/main">
+  <p:cSld>
+    <p:spTree>
+      <p:nvGrpSpPr>
+        <p:cNvPr id="1" name=""/>
+        <p:cNvGrpSpPr/>
+        <p:nvPr/>
+      </p:nvGrpSpPr>
+      <p:grpSpPr>
+        <a:xfrm>
+          <a:off x="0" y="0"/>
+          <a:ext cx="0" cy="0"/>
+          <a:chOff x="0" y="0"/>
+          <a:chExt cx="0" cy="0"/>
+        </a:xfrm>
+      </p:grpSpPr>
+      <p:sp>
+        <p:nvSpPr>
+          <p:cNvPr id="2" name="Title 1"/>
+          <p:cNvSpPr>
+            <a:spLocks noGrp="1"/>
+          </p:cNvSpPr>
+          <p:nvPr>
+            <p:ph type="title"/>
+          </p:nvPr>
+        </p:nvSpPr>
+        <p:spPr/>
+        <p:txBody>
+          <a:bodyPr/>
+          <a:lstStyle/>
+          <a:p>
+            <a:r>
+              <a:rPr lang="en-US" dirty="0"/>
+              <a:t>.NET</a:t>
+            </a:r>
+          </a:p>
+        </p:txBody>
+      </p:sp>
+      <p:sp>
+        <p:nvSpPr>
+          <p:cNvPr id="3" name="Content Placeholder 2"/>
+          <p:cNvSpPr>
+            <a:spLocks noGrp="1"/>
+          </p:cNvSpPr>
+          <p:nvPr>
+            <p:ph idx="1"/>
+          </p:nvPr>
+        </p:nvSpPr>
+        <p:spPr/>
+        <p:txBody>
+          <a:bodyPr/>
+          <a:lstStyle/>
+          <a:p>
+            <a:r>
+              <a:rPr lang="en-US" dirty="0"/>
+              <a:t>[</a:t>
+            </a:r>
+            <a:r>
+              <a:rPr lang="en-US" dirty="0" err="1"/>
+              <a:t>.net</a:t>
+            </a:r>
+            <a:r>
+              <a:rPr lang="en-US" dirty="0"/>
+              <a:t> example here]</a:t>
+            </a:r>
+          </a:p>
+        </p:txBody>
+      </p:sp>
+    </p:spTree>
+    <p:extLst>
+      <p:ext uri="{BB962C8B-B14F-4D97-AF65-F5344CB8AC3E}">
+        <p14:creationId xmlns:p14="http://schemas.microsoft.com/office/powerpoint/2010/main" val="2942029158"/>
+      </p:ext>
+    </p:extLst>
+  </p:cSld>
+  <p:clrMapOvr>
+    <a:masterClrMapping/>
+  </p:clrMapOvr>
+</p:sld>
+</file>
+
+<file path=ppt/slides/slide8.xml><?xml version="1.0" encoding="utf-8"?>
+<p:sld xmlns:a="http://schemas.openxmlformats.org/drawingml/2006/main" xmlns:r="http://schemas.openxmlformats.org/officeDocument/2006/relationships" xmlns:p="http://schemas.openxmlformats.org/presentationml/2006/main">
+  <p:cSld>
+    <p:spTree>
+      <p:nvGrpSpPr>
+        <p:cNvPr id="1" name=""/>
+        <p:cNvGrpSpPr/>
+        <p:nvPr/>
+      </p:nvGrpSpPr>
+      <p:grpSpPr>
+        <a:xfrm>
+          <a:off x="0" y="0"/>
+          <a:ext cx="0" cy="0"/>
+          <a:chOff x="0" y="0"/>
+          <a:chExt cx="0" cy="0"/>
+        </a:xfrm>
+      </p:grpSpPr>
+      <p:sp>
+        <p:nvSpPr>
+          <p:cNvPr id="2" name="Title 1"/>
+          <p:cNvSpPr>
+            <a:spLocks noGrp="1"/>
+          </p:cNvSpPr>
+          <p:nvPr>
+            <p:ph type="title"/>
+          </p:nvPr>
+        </p:nvSpPr>
+        <p:spPr/>
+        <p:txBody>
+          <a:bodyPr/>
+          <a:lstStyle/>
+          <a:p>
+            <a:r>
+              <a:rPr lang="en-US" dirty="0"/>
+              <a:t>Node</a:t>
+            </a:r>
+          </a:p>
+        </p:txBody>
+      </p:sp>
+      <p:sp>
+        <p:nvSpPr>
+          <p:cNvPr id="3" name="Content Placeholder 2"/>
+          <p:cNvSpPr>
+            <a:spLocks noGrp="1"/>
+          </p:cNvSpPr>
+          <p:nvPr>
+            <p:ph idx="1"/>
+          </p:nvPr>
+        </p:nvSpPr>
+        <p:spPr/>
+        <p:txBody>
+          <a:bodyPr/>
+          <a:lstStyle/>
+          <a:p>
+            <a:r>
+              <a:rPr lang="en-US" dirty="0"/>
+              <a:t>[node example here]</a:t>
+            </a:r>
+          </a:p>
+        </p:txBody>
+      </p:sp>
+    </p:spTree>
+    <p:extLst>
+      <p:ext uri="{BB962C8B-B14F-4D97-AF65-F5344CB8AC3E}">
+        <p14:creationId xmlns:p14="http://schemas.microsoft.com/office/powerpoint/2010/main" val="1218663727"/>
+      </p:ext>
+    </p:extLst>
+  </p:cSld>
+  <p:clrMapOvr>
+    <a:masterClrMapping/>
+  </p:clrMapOvr>
+</p:sld>
+</file>
+
+<file path=ppt/slides/slide9.xml><?xml version="1.0" encoding="utf-8"?>
 <p:sld xmlns:a="http://schemas.openxmlformats.org/drawingml/2006/main" xmlns:r="http://schemas.openxmlformats.org/officeDocument/2006/relationships" xmlns:p="http://schemas.openxmlformats.org/presentationml/2006/main">
   <p:cSld>
     <p:spTree>

</xml_diff>

<commit_message>
updated workshop code for .net, updated slides to go with it
</commit_message>
<xml_diff>
--- a/connect2016/developer/03/03.pptx
+++ b/connect2016/developer/03/03.pptx
@@ -6,10 +6,10 @@
     <p:sldMasterId id="2147483684" r:id="rId2"/>
   </p:sldMasterIdLst>
   <p:notesMasterIdLst>
-    <p:notesMasterId r:id="rId14"/>
+    <p:notesMasterId r:id="rId18"/>
   </p:notesMasterIdLst>
   <p:handoutMasterIdLst>
-    <p:handoutMasterId r:id="rId15"/>
+    <p:handoutMasterId r:id="rId19"/>
   </p:handoutMasterIdLst>
   <p:sldIdLst>
     <p:sldId id="444" r:id="rId3"/>
@@ -17,12 +17,16 @@
     <p:sldId id="496" r:id="rId5"/>
     <p:sldId id="494" r:id="rId6"/>
     <p:sldId id="500" r:id="rId7"/>
-    <p:sldId id="497" r:id="rId8"/>
-    <p:sldId id="498" r:id="rId9"/>
-    <p:sldId id="499" r:id="rId10"/>
-    <p:sldId id="502" r:id="rId11"/>
-    <p:sldId id="501" r:id="rId12"/>
-    <p:sldId id="484" r:id="rId13"/>
+    <p:sldId id="503" r:id="rId8"/>
+    <p:sldId id="504" r:id="rId9"/>
+    <p:sldId id="505" r:id="rId10"/>
+    <p:sldId id="506" r:id="rId11"/>
+    <p:sldId id="497" r:id="rId12"/>
+    <p:sldId id="498" r:id="rId13"/>
+    <p:sldId id="499" r:id="rId14"/>
+    <p:sldId id="502" r:id="rId15"/>
+    <p:sldId id="501" r:id="rId16"/>
+    <p:sldId id="484" r:id="rId17"/>
   </p:sldIdLst>
   <p:sldSz cx="9144000" cy="5143500" type="screen16x9"/>
   <p:notesSz cx="6858000" cy="9144000"/>
@@ -131,6 +135,10 @@
             <p14:sldId id="496"/>
             <p14:sldId id="494"/>
             <p14:sldId id="500"/>
+            <p14:sldId id="503"/>
+            <p14:sldId id="504"/>
+            <p14:sldId id="505"/>
+            <p14:sldId id="506"/>
             <p14:sldId id="497"/>
             <p14:sldId id="498"/>
             <p14:sldId id="499"/>
@@ -265,7 +273,7 @@
           <a:p>
             <a:fld id="{B5389E1E-C654-E943-9883-792E99AD7287}" type="datetimeFigureOut">
               <a:rPr lang="en-US" smtClean="0"/>
-              <a:t>10/24/2016</a:t>
+              <a:t>10/25/2016</a:t>
             </a:fld>
             <a:endParaRPr lang="en-US"/>
           </a:p>
@@ -431,7 +439,7 @@
           <a:p>
             <a:fld id="{9920D99B-2862-464A-984E-65BFC5FC0BBC}" type="datetimeFigureOut">
               <a:rPr lang="en-US" smtClean="0"/>
-              <a:t>10/24/2016</a:t>
+              <a:t>10/25/2016</a:t>
             </a:fld>
             <a:endParaRPr lang="en-US"/>
           </a:p>
@@ -697,6 +705,90 @@
     </a:lvl9pPr>
   </p:notesStyle>
 </p:notesMaster>
+</file>
+
+<file path=ppt/notesSlides/notesSlide1.xml><?xml version="1.0" encoding="utf-8"?>
+<p:notes xmlns:a="http://schemas.openxmlformats.org/drawingml/2006/main" xmlns:r="http://schemas.openxmlformats.org/officeDocument/2006/relationships" xmlns:p="http://schemas.openxmlformats.org/presentationml/2006/main">
+  <p:cSld>
+    <p:spTree>
+      <p:nvGrpSpPr>
+        <p:cNvPr id="1" name=""/>
+        <p:cNvGrpSpPr/>
+        <p:nvPr/>
+      </p:nvGrpSpPr>
+      <p:grpSpPr>
+        <a:xfrm>
+          <a:off x="0" y="0"/>
+          <a:ext cx="0" cy="0"/>
+          <a:chOff x="0" y="0"/>
+          <a:chExt cx="0" cy="0"/>
+        </a:xfrm>
+      </p:grpSpPr>
+      <p:sp>
+        <p:nvSpPr>
+          <p:cNvPr id="2" name="Slide Image Placeholder 1"/>
+          <p:cNvSpPr>
+            <a:spLocks noGrp="1" noRot="1" noChangeAspect="1"/>
+          </p:cNvSpPr>
+          <p:nvPr>
+            <p:ph type="sldImg"/>
+          </p:nvPr>
+        </p:nvSpPr>
+        <p:spPr/>
+      </p:sp>
+      <p:sp>
+        <p:nvSpPr>
+          <p:cNvPr id="3" name="Notes Placeholder 2"/>
+          <p:cNvSpPr>
+            <a:spLocks noGrp="1"/>
+          </p:cNvSpPr>
+          <p:nvPr>
+            <p:ph type="body" idx="1"/>
+          </p:nvPr>
+        </p:nvSpPr>
+        <p:spPr/>
+        <p:txBody>
+          <a:bodyPr/>
+          <a:lstStyle/>
+          <a:p>
+            <a:endParaRPr lang="en-US" dirty="0"/>
+          </a:p>
+        </p:txBody>
+      </p:sp>
+      <p:sp>
+        <p:nvSpPr>
+          <p:cNvPr id="4" name="Slide Number Placeholder 3"/>
+          <p:cNvSpPr>
+            <a:spLocks noGrp="1"/>
+          </p:cNvSpPr>
+          <p:nvPr>
+            <p:ph type="sldNum" sz="quarter" idx="10"/>
+          </p:nvPr>
+        </p:nvSpPr>
+        <p:spPr/>
+        <p:txBody>
+          <a:bodyPr/>
+          <a:lstStyle/>
+          <a:p>
+            <a:fld id="{F39351FC-18D6-4741-8EEB-9FDB1F020AAC}" type="slidenum">
+              <a:rPr lang="en-US" smtClean="0"/>
+              <a:t>9</a:t>
+            </a:fld>
+            <a:endParaRPr lang="en-US"/>
+          </a:p>
+        </p:txBody>
+      </p:sp>
+    </p:spTree>
+    <p:extLst>
+      <p:ext uri="{BB962C8B-B14F-4D97-AF65-F5344CB8AC3E}">
+        <p14:creationId xmlns:p14="http://schemas.microsoft.com/office/powerpoint/2010/main" val="4041048519"/>
+      </p:ext>
+    </p:extLst>
+  </p:cSld>
+  <p:clrMapOvr>
+    <a:masterClrMapping/>
+  </p:clrMapOvr>
+</p:notes>
 </file>
 
 <file path=ppt/slideLayouts/slideLayout1.xml><?xml version="1.0" encoding="utf-8"?>
@@ -6613,6 +6705,381 @@
           <a:p>
             <a:r>
               <a:rPr lang="en-US" dirty="0"/>
+              <a:t>Java</a:t>
+            </a:r>
+          </a:p>
+        </p:txBody>
+      </p:sp>
+      <p:sp>
+        <p:nvSpPr>
+          <p:cNvPr id="3" name="Content Placeholder 2"/>
+          <p:cNvSpPr>
+            <a:spLocks noGrp="1"/>
+          </p:cNvSpPr>
+          <p:nvPr>
+            <p:ph idx="1"/>
+          </p:nvPr>
+        </p:nvSpPr>
+        <p:spPr/>
+        <p:txBody>
+          <a:bodyPr/>
+          <a:lstStyle/>
+          <a:p>
+            <a:r>
+              <a:rPr lang="en-US" dirty="0"/>
+              <a:t>[java example here]</a:t>
+            </a:r>
+          </a:p>
+        </p:txBody>
+      </p:sp>
+    </p:spTree>
+    <p:extLst>
+      <p:ext uri="{BB962C8B-B14F-4D97-AF65-F5344CB8AC3E}">
+        <p14:creationId xmlns:p14="http://schemas.microsoft.com/office/powerpoint/2010/main" val="3978316419"/>
+      </p:ext>
+    </p:extLst>
+  </p:cSld>
+  <p:clrMapOvr>
+    <a:masterClrMapping/>
+  </p:clrMapOvr>
+</p:sld>
+</file>
+
+<file path=ppt/slides/slide11.xml><?xml version="1.0" encoding="utf-8"?>
+<p:sld xmlns:a="http://schemas.openxmlformats.org/drawingml/2006/main" xmlns:r="http://schemas.openxmlformats.org/officeDocument/2006/relationships" xmlns:p="http://schemas.openxmlformats.org/presentationml/2006/main">
+  <p:cSld>
+    <p:spTree>
+      <p:nvGrpSpPr>
+        <p:cNvPr id="1" name=""/>
+        <p:cNvGrpSpPr/>
+        <p:nvPr/>
+      </p:nvGrpSpPr>
+      <p:grpSpPr>
+        <a:xfrm>
+          <a:off x="0" y="0"/>
+          <a:ext cx="0" cy="0"/>
+          <a:chOff x="0" y="0"/>
+          <a:chExt cx="0" cy="0"/>
+        </a:xfrm>
+      </p:grpSpPr>
+      <p:sp>
+        <p:nvSpPr>
+          <p:cNvPr id="2" name="Title 1"/>
+          <p:cNvSpPr>
+            <a:spLocks noGrp="1"/>
+          </p:cNvSpPr>
+          <p:nvPr>
+            <p:ph type="title"/>
+          </p:nvPr>
+        </p:nvSpPr>
+        <p:spPr/>
+        <p:txBody>
+          <a:bodyPr/>
+          <a:lstStyle/>
+          <a:p>
+            <a:r>
+              <a:rPr lang="en-US" dirty="0"/>
+              <a:t>.NET</a:t>
+            </a:r>
+          </a:p>
+        </p:txBody>
+      </p:sp>
+      <p:sp>
+        <p:nvSpPr>
+          <p:cNvPr id="3" name="Content Placeholder 2"/>
+          <p:cNvSpPr>
+            <a:spLocks noGrp="1"/>
+          </p:cNvSpPr>
+          <p:nvPr>
+            <p:ph idx="1"/>
+          </p:nvPr>
+        </p:nvSpPr>
+        <p:spPr/>
+        <p:txBody>
+          <a:bodyPr/>
+          <a:lstStyle/>
+          <a:p>
+            <a:pPr marL="342900" indent="-342900">
+              <a:buFont typeface="Arial" panose="020B0604020202020204" pitchFamily="34" charset="0"/>
+              <a:buChar char="•"/>
+            </a:pPr>
+            <a:r>
+              <a:rPr lang="en-US" dirty="0"/>
+              <a:t>Look for TODOs</a:t>
+            </a:r>
+          </a:p>
+          <a:p>
+            <a:pPr marL="342900" indent="-342900">
+              <a:buFont typeface="Arial" panose="020B0604020202020204" pitchFamily="34" charset="0"/>
+              <a:buChar char="•"/>
+            </a:pPr>
+            <a:endParaRPr lang="en-US" dirty="0"/>
+          </a:p>
+          <a:p>
+            <a:pPr marL="342900" indent="-342900">
+              <a:buFont typeface="Arial" panose="020B0604020202020204" pitchFamily="34" charset="0"/>
+              <a:buChar char="•"/>
+            </a:pPr>
+            <a:r>
+              <a:rPr lang="en-US" dirty="0"/>
+              <a:t>Files included:</a:t>
+            </a:r>
+          </a:p>
+          <a:p>
+            <a:pPr marL="573088" lvl="1" indent="-342900">
+              <a:buFont typeface="Arial" panose="020B0604020202020204" pitchFamily="34" charset="0"/>
+              <a:buChar char="•"/>
+            </a:pPr>
+            <a:r>
+              <a:rPr lang="en-US" sz="2000" dirty="0" err="1"/>
+              <a:t>CouchbaseConfig.cs</a:t>
+            </a:r>
+            <a:endParaRPr lang="en-US" sz="2000" dirty="0"/>
+          </a:p>
+          <a:p>
+            <a:pPr marL="573088" lvl="1" indent="-342900">
+              <a:buFont typeface="Arial" panose="020B0604020202020204" pitchFamily="34" charset="0"/>
+              <a:buChar char="•"/>
+            </a:pPr>
+            <a:r>
+              <a:rPr lang="en-US" sz="2000" dirty="0" err="1"/>
+              <a:t>Web.config</a:t>
+            </a:r>
+            <a:endParaRPr lang="en-US" sz="2000" dirty="0"/>
+          </a:p>
+          <a:p>
+            <a:pPr marL="573088" lvl="1" indent="-342900">
+              <a:buFont typeface="Arial" panose="020B0604020202020204" pitchFamily="34" charset="0"/>
+              <a:buChar char="•"/>
+            </a:pPr>
+            <a:r>
+              <a:rPr lang="en-US" sz="2000" dirty="0" err="1"/>
+              <a:t>Person.cs</a:t>
+            </a:r>
+            <a:endParaRPr lang="en-US" sz="2000" dirty="0"/>
+          </a:p>
+          <a:p>
+            <a:pPr marL="573088" lvl="1" indent="-342900">
+              <a:buFont typeface="Arial" panose="020B0604020202020204" pitchFamily="34" charset="0"/>
+              <a:buChar char="•"/>
+            </a:pPr>
+            <a:r>
+              <a:rPr lang="en-US" sz="2000" dirty="0" err="1"/>
+              <a:t>PersonController.cs</a:t>
+            </a:r>
+            <a:endParaRPr lang="en-US" sz="2000" dirty="0"/>
+          </a:p>
+          <a:p>
+            <a:pPr marL="573088" lvl="1" indent="-342900">
+              <a:buFont typeface="Arial" panose="020B0604020202020204" pitchFamily="34" charset="0"/>
+              <a:buChar char="•"/>
+            </a:pPr>
+            <a:endParaRPr lang="en-US" dirty="0"/>
+          </a:p>
+          <a:p>
+            <a:pPr marL="342900" indent="-342900">
+              <a:buFont typeface="Arial" panose="020B0604020202020204" pitchFamily="34" charset="0"/>
+              <a:buChar char="•"/>
+            </a:pPr>
+            <a:endParaRPr lang="en-US" dirty="0"/>
+          </a:p>
+        </p:txBody>
+      </p:sp>
+    </p:spTree>
+    <p:extLst>
+      <p:ext uri="{BB962C8B-B14F-4D97-AF65-F5344CB8AC3E}">
+        <p14:creationId xmlns:p14="http://schemas.microsoft.com/office/powerpoint/2010/main" val="2942029158"/>
+      </p:ext>
+    </p:extLst>
+  </p:cSld>
+  <p:clrMapOvr>
+    <a:masterClrMapping/>
+  </p:clrMapOvr>
+</p:sld>
+</file>
+
+<file path=ppt/slides/slide12.xml><?xml version="1.0" encoding="utf-8"?>
+<p:sld xmlns:a="http://schemas.openxmlformats.org/drawingml/2006/main" xmlns:r="http://schemas.openxmlformats.org/officeDocument/2006/relationships" xmlns:p="http://schemas.openxmlformats.org/presentationml/2006/main">
+  <p:cSld>
+    <p:spTree>
+      <p:nvGrpSpPr>
+        <p:cNvPr id="1" name=""/>
+        <p:cNvGrpSpPr/>
+        <p:nvPr/>
+      </p:nvGrpSpPr>
+      <p:grpSpPr>
+        <a:xfrm>
+          <a:off x="0" y="0"/>
+          <a:ext cx="0" cy="0"/>
+          <a:chOff x="0" y="0"/>
+          <a:chExt cx="0" cy="0"/>
+        </a:xfrm>
+      </p:grpSpPr>
+      <p:sp>
+        <p:nvSpPr>
+          <p:cNvPr id="2" name="Title 1"/>
+          <p:cNvSpPr>
+            <a:spLocks noGrp="1"/>
+          </p:cNvSpPr>
+          <p:nvPr>
+            <p:ph type="title"/>
+          </p:nvPr>
+        </p:nvSpPr>
+        <p:spPr/>
+        <p:txBody>
+          <a:bodyPr/>
+          <a:lstStyle/>
+          <a:p>
+            <a:r>
+              <a:rPr lang="en-US" dirty="0"/>
+              <a:t>Node</a:t>
+            </a:r>
+          </a:p>
+        </p:txBody>
+      </p:sp>
+      <p:sp>
+        <p:nvSpPr>
+          <p:cNvPr id="3" name="Content Placeholder 2"/>
+          <p:cNvSpPr>
+            <a:spLocks noGrp="1"/>
+          </p:cNvSpPr>
+          <p:nvPr>
+            <p:ph idx="1"/>
+          </p:nvPr>
+        </p:nvSpPr>
+        <p:spPr/>
+        <p:txBody>
+          <a:bodyPr/>
+          <a:lstStyle/>
+          <a:p>
+            <a:r>
+              <a:rPr lang="en-US" dirty="0"/>
+              <a:t>[node example here]</a:t>
+            </a:r>
+          </a:p>
+        </p:txBody>
+      </p:sp>
+    </p:spTree>
+    <p:extLst>
+      <p:ext uri="{BB962C8B-B14F-4D97-AF65-F5344CB8AC3E}">
+        <p14:creationId xmlns:p14="http://schemas.microsoft.com/office/powerpoint/2010/main" val="1218663727"/>
+      </p:ext>
+    </p:extLst>
+  </p:cSld>
+  <p:clrMapOvr>
+    <a:masterClrMapping/>
+  </p:clrMapOvr>
+</p:sld>
+</file>
+
+<file path=ppt/slides/slide13.xml><?xml version="1.0" encoding="utf-8"?>
+<p:sld xmlns:a="http://schemas.openxmlformats.org/drawingml/2006/main" xmlns:r="http://schemas.openxmlformats.org/officeDocument/2006/relationships" xmlns:p="http://schemas.openxmlformats.org/presentationml/2006/main">
+  <p:cSld>
+    <p:spTree>
+      <p:nvGrpSpPr>
+        <p:cNvPr id="1" name=""/>
+        <p:cNvGrpSpPr/>
+        <p:nvPr/>
+      </p:nvGrpSpPr>
+      <p:grpSpPr>
+        <a:xfrm>
+          <a:off x="0" y="0"/>
+          <a:ext cx="0" cy="0"/>
+          <a:chOff x="0" y="0"/>
+          <a:chExt cx="0" cy="0"/>
+        </a:xfrm>
+      </p:grpSpPr>
+      <p:sp>
+        <p:nvSpPr>
+          <p:cNvPr id="2" name="Title 1"/>
+          <p:cNvSpPr>
+            <a:spLocks noGrp="1"/>
+          </p:cNvSpPr>
+          <p:nvPr>
+            <p:ph type="title"/>
+          </p:nvPr>
+        </p:nvSpPr>
+        <p:spPr/>
+        <p:txBody>
+          <a:bodyPr/>
+          <a:lstStyle/>
+          <a:p>
+            <a:r>
+              <a:rPr lang="en-US" dirty="0"/>
+              <a:t>Angular</a:t>
+            </a:r>
+          </a:p>
+        </p:txBody>
+      </p:sp>
+      <p:sp>
+        <p:nvSpPr>
+          <p:cNvPr id="3" name="Content Placeholder 2"/>
+          <p:cNvSpPr>
+            <a:spLocks noGrp="1"/>
+          </p:cNvSpPr>
+          <p:nvPr>
+            <p:ph idx="1"/>
+          </p:nvPr>
+        </p:nvSpPr>
+        <p:spPr/>
+        <p:txBody>
+          <a:bodyPr/>
+          <a:lstStyle/>
+          <a:p>
+            <a:r>
+              <a:rPr lang="en-US" dirty="0"/>
+              <a:t>[angular example here of specifying port number]</a:t>
+            </a:r>
+          </a:p>
+        </p:txBody>
+      </p:sp>
+    </p:spTree>
+    <p:extLst>
+      <p:ext uri="{BB962C8B-B14F-4D97-AF65-F5344CB8AC3E}">
+        <p14:creationId xmlns:p14="http://schemas.microsoft.com/office/powerpoint/2010/main" val="1029063382"/>
+      </p:ext>
+    </p:extLst>
+  </p:cSld>
+  <p:clrMapOvr>
+    <a:masterClrMapping/>
+  </p:clrMapOvr>
+</p:sld>
+</file>
+
+<file path=ppt/slides/slide14.xml><?xml version="1.0" encoding="utf-8"?>
+<p:sld xmlns:a="http://schemas.openxmlformats.org/drawingml/2006/main" xmlns:r="http://schemas.openxmlformats.org/officeDocument/2006/relationships" xmlns:p="http://schemas.openxmlformats.org/presentationml/2006/main">
+  <p:cSld>
+    <p:spTree>
+      <p:nvGrpSpPr>
+        <p:cNvPr id="1" name=""/>
+        <p:cNvGrpSpPr/>
+        <p:nvPr/>
+      </p:nvGrpSpPr>
+      <p:grpSpPr>
+        <a:xfrm>
+          <a:off x="0" y="0"/>
+          <a:ext cx="0" cy="0"/>
+          <a:chOff x="0" y="0"/>
+          <a:chExt cx="0" cy="0"/>
+        </a:xfrm>
+      </p:grpSpPr>
+      <p:sp>
+        <p:nvSpPr>
+          <p:cNvPr id="2" name="Title 1"/>
+          <p:cNvSpPr>
+            <a:spLocks noGrp="1"/>
+          </p:cNvSpPr>
+          <p:nvPr>
+            <p:ph type="title"/>
+          </p:nvPr>
+        </p:nvSpPr>
+        <p:spPr/>
+        <p:txBody>
+          <a:bodyPr/>
+          <a:lstStyle/>
+          <a:p>
+            <a:r>
+              <a:rPr lang="en-US" dirty="0"/>
               <a:t>How to execute</a:t>
             </a:r>
           </a:p>
@@ -6734,7 +7201,7 @@
 </p:sld>
 </file>
 
-<file path=ppt/slides/slide11.xml><?xml version="1.0" encoding="utf-8"?>
+<file path=ppt/slides/slide15.xml><?xml version="1.0" encoding="utf-8"?>
 <p:sld xmlns:a="http://schemas.openxmlformats.org/drawingml/2006/main" xmlns:r="http://schemas.openxmlformats.org/officeDocument/2006/relationships" xmlns:p="http://schemas.openxmlformats.org/presentationml/2006/main">
   <p:cSld>
     <p:spTree>
@@ -7540,7 +8007,7 @@
           <a:p>
             <a:r>
               <a:rPr lang="en-US" dirty="0"/>
-              <a:t>Java</a:t>
+              <a:t>Asynchronous</a:t>
             </a:r>
           </a:p>
         </p:txBody>
@@ -7562,15 +8029,64 @@
           <a:p>
             <a:r>
               <a:rPr lang="en-US" dirty="0"/>
-              <a:t>[java example here]</a:t>
-            </a:r>
+              <a:t>.NET:</a:t>
+            </a:r>
+          </a:p>
+          <a:p>
+            <a:r>
+              <a:rPr lang="en-US" dirty="0"/>
+              <a:t>	</a:t>
+            </a:r>
+            <a:r>
+              <a:rPr lang="en-US" dirty="0" err="1"/>
+              <a:t>async</a:t>
+            </a:r>
+            <a:r>
+              <a:rPr lang="en-US" dirty="0"/>
+              <a:t>/await/Task</a:t>
+            </a:r>
+          </a:p>
+          <a:p>
+            <a:endParaRPr lang="en-US" dirty="0"/>
+          </a:p>
+          <a:p>
+            <a:r>
+              <a:rPr lang="en-US" dirty="0"/>
+              <a:t>Node:</a:t>
+            </a:r>
+          </a:p>
+          <a:p>
+            <a:r>
+              <a:rPr lang="en-US" dirty="0"/>
+              <a:t>	callbacks</a:t>
+            </a:r>
+          </a:p>
+          <a:p>
+            <a:endParaRPr lang="en-US" dirty="0"/>
+          </a:p>
+          <a:p>
+            <a:r>
+              <a:rPr lang="en-US" dirty="0"/>
+              <a:t>Java:</a:t>
+            </a:r>
+          </a:p>
+          <a:p>
+            <a:r>
+              <a:rPr lang="en-US" dirty="0"/>
+              <a:t>	spring-data-</a:t>
+            </a:r>
+            <a:r>
+              <a:rPr lang="en-US" dirty="0" err="1"/>
+              <a:t>couchbase</a:t>
+            </a:r>
+            <a:endParaRPr lang="en-US" dirty="0"/>
           </a:p>
         </p:txBody>
       </p:sp>
     </p:spTree>
     <p:extLst>
       <p:ext uri="{BB962C8B-B14F-4D97-AF65-F5344CB8AC3E}">
-        <p14:creationId xmlns:p14="http://schemas.microsoft.com/office/powerpoint/2010/main" val="3978316419"/>
+        <p14:creationId xmlns:p14="http://schemas.microsoft.com/office/powerpoint/2010/main" val="654987578"/>
       </p:ext>
     </p:extLst>
   </p:cSld>
@@ -7614,7 +8130,7 @@
           <a:p>
             <a:r>
               <a:rPr lang="en-US" dirty="0"/>
-              <a:t>.NET</a:t>
+              <a:t>N1QL</a:t>
             </a:r>
           </a:p>
         </p:txBody>
@@ -7636,15 +8152,36 @@
           <a:p>
             <a:r>
               <a:rPr lang="en-US" dirty="0"/>
-              <a:t>[</a:t>
+              <a:t>.NET:</a:t>
+            </a:r>
+          </a:p>
+          <a:p>
+            <a:r>
+              <a:rPr lang="en-US" dirty="0"/>
+              <a:t>	</a:t>
             </a:r>
             <a:r>
               <a:rPr lang="en-US" dirty="0" err="1"/>
-              <a:t>.net</a:t>
-            </a:r>
+              <a:t>QueryRequest</a:t>
+            </a:r>
+            <a:endParaRPr lang="en-US" dirty="0"/>
+          </a:p>
+          <a:p>
+            <a:endParaRPr lang="en-US" dirty="0"/>
+          </a:p>
+          <a:p>
             <a:r>
               <a:rPr lang="en-US" dirty="0"/>
-              <a:t> example here]</a:t>
+              <a:t>Node:</a:t>
+            </a:r>
+          </a:p>
+          <a:p>
+            <a:endParaRPr lang="en-US" dirty="0"/>
+          </a:p>
+          <a:p>
+            <a:r>
+              <a:rPr lang="en-US" dirty="0"/>
+              <a:t>Java:</a:t>
             </a:r>
           </a:p>
         </p:txBody>
@@ -7652,7 +8189,7 @@
     </p:spTree>
     <p:extLst>
       <p:ext uri="{BB962C8B-B14F-4D97-AF65-F5344CB8AC3E}">
-        <p14:creationId xmlns:p14="http://schemas.microsoft.com/office/powerpoint/2010/main" val="2942029158"/>
+        <p14:creationId xmlns:p14="http://schemas.microsoft.com/office/powerpoint/2010/main" val="4172646505"/>
       </p:ext>
     </p:extLst>
   </p:cSld>
@@ -7696,7 +8233,7 @@
           <a:p>
             <a:r>
               <a:rPr lang="en-US" dirty="0"/>
-              <a:t>Node</a:t>
+              <a:t>Scan Consistency</a:t>
             </a:r>
           </a:p>
         </p:txBody>
@@ -7717,8 +8254,47 @@
           <a:lstStyle/>
           <a:p>
             <a:r>
+              <a:rPr lang="en-US" dirty="0" err="1"/>
+              <a:t>NotBounded</a:t>
+            </a:r>
+            <a:endParaRPr lang="en-US" dirty="0"/>
+          </a:p>
+          <a:p>
+            <a:r>
               <a:rPr lang="en-US" dirty="0"/>
-              <a:t>[node example here]</a:t>
+              <a:t>	Default (speed)</a:t>
+            </a:r>
+          </a:p>
+          <a:p>
+            <a:endParaRPr lang="en-US" dirty="0"/>
+          </a:p>
+          <a:p>
+            <a:r>
+              <a:rPr lang="en-US" dirty="0" err="1"/>
+              <a:t>RequestPlus</a:t>
+            </a:r>
+            <a:endParaRPr lang="en-US" dirty="0"/>
+          </a:p>
+          <a:p>
+            <a:r>
+              <a:rPr lang="en-US" dirty="0"/>
+              <a:t>	Accuracy (slower)</a:t>
+            </a:r>
+          </a:p>
+          <a:p>
+            <a:endParaRPr lang="en-US" dirty="0"/>
+          </a:p>
+          <a:p>
+            <a:r>
+              <a:rPr lang="en-US" dirty="0" err="1"/>
+              <a:t>AtPlus</a:t>
+            </a:r>
+            <a:endParaRPr lang="en-US" dirty="0"/>
+          </a:p>
+          <a:p>
+            <a:r>
+              <a:rPr lang="en-US" dirty="0"/>
+              <a:t>	Speed and accuracy (more work)</a:t>
             </a:r>
           </a:p>
         </p:txBody>
@@ -7726,7 +8302,7 @@
     </p:spTree>
     <p:extLst>
       <p:ext uri="{BB962C8B-B14F-4D97-AF65-F5344CB8AC3E}">
-        <p14:creationId xmlns:p14="http://schemas.microsoft.com/office/powerpoint/2010/main" val="1218663727"/>
+        <p14:creationId xmlns:p14="http://schemas.microsoft.com/office/powerpoint/2010/main" val="75123803"/>
       </p:ext>
     </p:extLst>
   </p:cSld>
@@ -7770,7 +8346,7 @@
           <a:p>
             <a:r>
               <a:rPr lang="en-US" dirty="0"/>
-              <a:t>Angular</a:t>
+              <a:t>Error handling</a:t>
             </a:r>
           </a:p>
         </p:txBody>
@@ -7792,7 +8368,31 @@
           <a:p>
             <a:r>
               <a:rPr lang="en-US" dirty="0"/>
-              <a:t>[angular example here of specifying port number]</a:t>
+              <a:t>.NET:</a:t>
+            </a:r>
+          </a:p>
+          <a:p>
+            <a:r>
+              <a:rPr lang="en-US" dirty="0"/>
+              <a:t>	Result objects include: Exception, Success, Message</a:t>
+            </a:r>
+          </a:p>
+          <a:p>
+            <a:endParaRPr lang="en-US" dirty="0"/>
+          </a:p>
+          <a:p>
+            <a:r>
+              <a:rPr lang="en-US" dirty="0"/>
+              <a:t>Java:</a:t>
+            </a:r>
+          </a:p>
+          <a:p>
+            <a:endParaRPr lang="en-US" dirty="0"/>
+          </a:p>
+          <a:p>
+            <a:r>
+              <a:rPr lang="en-US" dirty="0"/>
+              <a:t>Node:</a:t>
             </a:r>
           </a:p>
         </p:txBody>
@@ -7800,7 +8400,7 @@
     </p:spTree>
     <p:extLst>
       <p:ext uri="{BB962C8B-B14F-4D97-AF65-F5344CB8AC3E}">
-        <p14:creationId xmlns:p14="http://schemas.microsoft.com/office/powerpoint/2010/main" val="1029063382"/>
+        <p14:creationId xmlns:p14="http://schemas.microsoft.com/office/powerpoint/2010/main" val="4206428468"/>
       </p:ext>
     </p:extLst>
   </p:cSld>

</xml_diff>

<commit_message>
added angular fill-in-the-blank code and updated slides
</commit_message>
<xml_diff>
--- a/connect2016/developer/03/03.pptx
+++ b/connect2016/developer/03/03.pptx
@@ -7013,7 +7013,7 @@
       </p:sp>
       <p:sp>
         <p:nvSpPr>
-          <p:cNvPr id="3" name="Content Placeholder 2"/>
+          <p:cNvPr id="5" name="Content Placeholder 2"/>
           <p:cNvSpPr>
             <a:spLocks noGrp="1"/>
           </p:cNvSpPr>
@@ -7021,15 +7021,108 @@
             <p:ph idx="1"/>
           </p:nvPr>
         </p:nvSpPr>
-        <p:spPr/>
+        <p:spPr>
+          <a:xfrm>
+            <a:off x="457200" y="685800"/>
+            <a:ext cx="8007739" cy="3394472"/>
+          </a:xfrm>
+        </p:spPr>
         <p:txBody>
           <a:bodyPr/>
           <a:lstStyle/>
           <a:p>
+            <a:pPr marL="342900" indent="-342900">
+              <a:buFont typeface="Arial" panose="020B0604020202020204" pitchFamily="34" charset="0"/>
+              <a:buChar char="•"/>
+            </a:pPr>
             <a:r>
               <a:rPr lang="en-US" dirty="0"/>
-              <a:t>[angular example here of specifying port number]</a:t>
-            </a:r>
+              <a:t>Look for TODOs</a:t>
+            </a:r>
+          </a:p>
+          <a:p>
+            <a:pPr marL="342900" indent="-342900">
+              <a:buFont typeface="Arial" panose="020B0604020202020204" pitchFamily="34" charset="0"/>
+              <a:buChar char="•"/>
+            </a:pPr>
+            <a:endParaRPr lang="en-US" dirty="0"/>
+          </a:p>
+          <a:p>
+            <a:pPr marL="342900" indent="-342900">
+              <a:buFont typeface="Arial" panose="020B0604020202020204" pitchFamily="34" charset="0"/>
+              <a:buChar char="•"/>
+            </a:pPr>
+            <a:r>
+              <a:rPr lang="en-US" dirty="0"/>
+              <a:t>Files included:</a:t>
+            </a:r>
+          </a:p>
+          <a:p>
+            <a:pPr marL="573088" lvl="1" indent="-342900">
+              <a:buFont typeface="Arial" panose="020B0604020202020204" pitchFamily="34" charset="0"/>
+              <a:buChar char="•"/>
+            </a:pPr>
+            <a:r>
+              <a:rPr lang="en-US" sz="2000" dirty="0" err="1"/>
+              <a:t>utility.ts</a:t>
+            </a:r>
+            <a:endParaRPr lang="en-US" sz="2000" dirty="0"/>
+          </a:p>
+          <a:p>
+            <a:pPr marL="573088" lvl="1" indent="-342900">
+              <a:buFont typeface="Arial" panose="020B0604020202020204" pitchFamily="34" charset="0"/>
+              <a:buChar char="•"/>
+            </a:pPr>
+            <a:r>
+              <a:rPr lang="en-US" sz="2000" dirty="0" err="1"/>
+              <a:t>item.component.ts</a:t>
+            </a:r>
+            <a:endParaRPr lang="en-US" sz="2000" dirty="0"/>
+          </a:p>
+          <a:p>
+            <a:pPr marL="573088" lvl="1" indent="-342900">
+              <a:buFont typeface="Arial" panose="020B0604020202020204" pitchFamily="34" charset="0"/>
+              <a:buChar char="•"/>
+            </a:pPr>
+            <a:r>
+              <a:rPr lang="en-US" sz="2000" dirty="0"/>
+              <a:t>item.component.html</a:t>
+            </a:r>
+          </a:p>
+          <a:p>
+            <a:pPr marL="573088" lvl="1" indent="-342900">
+              <a:buFont typeface="Arial" panose="020B0604020202020204" pitchFamily="34" charset="0"/>
+              <a:buChar char="•"/>
+            </a:pPr>
+            <a:r>
+              <a:rPr lang="en-US" sz="2000" dirty="0" err="1"/>
+              <a:t>list.component.ts</a:t>
+            </a:r>
+            <a:endParaRPr lang="en-US" sz="2000" dirty="0"/>
+          </a:p>
+          <a:p>
+            <a:pPr marL="573088" lvl="1" indent="-342900">
+              <a:buFont typeface="Arial" panose="020B0604020202020204" pitchFamily="34" charset="0"/>
+              <a:buChar char="•"/>
+            </a:pPr>
+            <a:r>
+              <a:rPr lang="en-US" sz="2000" dirty="0"/>
+              <a:t>list.component.html</a:t>
+            </a:r>
+          </a:p>
+          <a:p>
+            <a:pPr marL="573088" lvl="1" indent="-342900">
+              <a:buFont typeface="Arial" panose="020B0604020202020204" pitchFamily="34" charset="0"/>
+              <a:buChar char="•"/>
+            </a:pPr>
+            <a:endParaRPr lang="en-US" dirty="0"/>
+          </a:p>
+          <a:p>
+            <a:pPr marL="342900" indent="-342900">
+              <a:buFont typeface="Arial" panose="020B0604020202020204" pitchFamily="34" charset="0"/>
+              <a:buChar char="•"/>
+            </a:pPr>
+            <a:endParaRPr lang="en-US" dirty="0"/>
           </a:p>
         </p:txBody>
       </p:sp>

</xml_diff>

<commit_message>
TODO code for part 3 node, updated corresponding slides for part 3
</commit_message>
<xml_diff>
--- a/connect2016/developer/03/03.pptx
+++ b/connect2016/developer/03/03.pptx
@@ -273,7 +273,7 @@
           <a:p>
             <a:fld id="{B5389E1E-C654-E943-9883-792E99AD7287}" type="datetimeFigureOut">
               <a:rPr lang="en-US" smtClean="0"/>
-              <a:t>10/25/2016</a:t>
+              <a:t>10/26/2016</a:t>
             </a:fld>
             <a:endParaRPr lang="en-US"/>
           </a:p>
@@ -439,7 +439,7 @@
           <a:p>
             <a:fld id="{9920D99B-2862-464A-984E-65BFC5FC0BBC}" type="datetimeFigureOut">
               <a:rPr lang="en-US" smtClean="0"/>
-              <a:t>10/25/2016</a:t>
+              <a:t>10/26/2016</a:t>
             </a:fld>
             <a:endParaRPr lang="en-US"/>
           </a:p>
@@ -6952,10 +6952,59 @@
           <a:bodyPr/>
           <a:lstStyle/>
           <a:p>
+            <a:pPr marL="342900" indent="-342900">
+              <a:buFont typeface="Arial" panose="020B0604020202020204" pitchFamily="34" charset="0"/>
+              <a:buChar char="•"/>
+            </a:pPr>
             <a:r>
               <a:rPr lang="en-US" dirty="0"/>
-              <a:t>[node example here]</a:t>
-            </a:r>
+              <a:t>Look for TODOs</a:t>
+            </a:r>
+          </a:p>
+          <a:p>
+            <a:pPr marL="342900" indent="-342900">
+              <a:buFont typeface="Arial" panose="020B0604020202020204" pitchFamily="34" charset="0"/>
+              <a:buChar char="•"/>
+            </a:pPr>
+            <a:endParaRPr lang="en-US" dirty="0"/>
+          </a:p>
+          <a:p>
+            <a:pPr marL="342900" indent="-342900">
+              <a:buFont typeface="Arial" panose="020B0604020202020204" pitchFamily="34" charset="0"/>
+              <a:buChar char="•"/>
+            </a:pPr>
+            <a:r>
+              <a:rPr lang="en-US" dirty="0"/>
+              <a:t>Files includes:</a:t>
+            </a:r>
+          </a:p>
+          <a:p>
+            <a:pPr marL="573088" lvl="1" indent="-342900">
+              <a:buFont typeface="Arial" panose="020B0604020202020204" pitchFamily="34" charset="0"/>
+              <a:buChar char="•"/>
+            </a:pPr>
+            <a:r>
+              <a:rPr lang="en-US" sz="2000" dirty="0" err="1"/>
+              <a:t>default.json</a:t>
+            </a:r>
+            <a:endParaRPr lang="en-US" sz="2000" dirty="0"/>
+          </a:p>
+          <a:p>
+            <a:pPr marL="573088" lvl="1" indent="-342900">
+              <a:buFont typeface="Arial" panose="020B0604020202020204" pitchFamily="34" charset="0"/>
+              <a:buChar char="•"/>
+            </a:pPr>
+            <a:r>
+              <a:rPr lang="en-US" sz="2000" dirty="0"/>
+              <a:t>api.js</a:t>
+            </a:r>
+          </a:p>
+          <a:p>
+            <a:pPr marL="573088" lvl="1" indent="-342900">
+              <a:buFont typeface="Arial" panose="020B0604020202020204" pitchFamily="34" charset="0"/>
+              <a:buChar char="•"/>
+            </a:pPr>
+            <a:endParaRPr lang="en-US" dirty="0"/>
           </a:p>
         </p:txBody>
       </p:sp>
@@ -8269,6 +8318,12 @@
             </a:r>
           </a:p>
           <a:p>
+            <a:r>
+              <a:rPr lang="en-US" dirty="0"/>
+              <a:t>	N1qlQuery</a:t>
+            </a:r>
+          </a:p>
+          <a:p>
             <a:endParaRPr lang="en-US" dirty="0"/>
           </a:p>
           <a:p>
@@ -8483,10 +8538,26 @@
             <a:endParaRPr lang="en-US" dirty="0"/>
           </a:p>
           <a:p>
+            <a:endParaRPr lang="en-US" dirty="0"/>
+          </a:p>
+          <a:p>
             <a:r>
               <a:rPr lang="en-US" dirty="0"/>
               <a:t>Node:</a:t>
             </a:r>
+          </a:p>
+          <a:p>
+            <a:r>
+              <a:rPr lang="en-US" dirty="0"/>
+              <a:t>	Callbacks - </a:t>
+            </a:r>
+            <a:r>
+              <a:rPr lang="en-US" i="1" dirty="0"/>
+              <a:t>function(err, result) { }</a:t>
+            </a:r>
+          </a:p>
+          <a:p>
+            <a:endParaRPr lang="en-US" dirty="0"/>
           </a:p>
         </p:txBody>
       </p:sp>

</xml_diff>

<commit_message>
added java_workshop folder, updated slides
</commit_message>
<xml_diff>
--- a/connect2016/developer/03/03.pptx
+++ b/connect2016/developer/03/03.pptx
@@ -6,10 +6,10 @@
     <p:sldMasterId id="2147483684" r:id="rId2"/>
   </p:sldMasterIdLst>
   <p:notesMasterIdLst>
-    <p:notesMasterId r:id="rId18"/>
+    <p:notesMasterId r:id="rId19"/>
   </p:notesMasterIdLst>
   <p:handoutMasterIdLst>
-    <p:handoutMasterId r:id="rId19"/>
+    <p:handoutMasterId r:id="rId20"/>
   </p:handoutMasterIdLst>
   <p:sldIdLst>
     <p:sldId id="444" r:id="rId3"/>
@@ -20,13 +20,14 @@
     <p:sldId id="503" r:id="rId8"/>
     <p:sldId id="504" r:id="rId9"/>
     <p:sldId id="505" r:id="rId10"/>
-    <p:sldId id="506" r:id="rId11"/>
-    <p:sldId id="497" r:id="rId12"/>
-    <p:sldId id="498" r:id="rId13"/>
-    <p:sldId id="499" r:id="rId14"/>
-    <p:sldId id="502" r:id="rId15"/>
-    <p:sldId id="501" r:id="rId16"/>
-    <p:sldId id="484" r:id="rId17"/>
+    <p:sldId id="507" r:id="rId11"/>
+    <p:sldId id="506" r:id="rId12"/>
+    <p:sldId id="497" r:id="rId13"/>
+    <p:sldId id="498" r:id="rId14"/>
+    <p:sldId id="499" r:id="rId15"/>
+    <p:sldId id="502" r:id="rId16"/>
+    <p:sldId id="501" r:id="rId17"/>
+    <p:sldId id="484" r:id="rId18"/>
   </p:sldIdLst>
   <p:sldSz cx="9144000" cy="5143500" type="screen16x9"/>
   <p:notesSz cx="6858000" cy="9144000"/>
@@ -138,6 +139,7 @@
             <p14:sldId id="503"/>
             <p14:sldId id="504"/>
             <p14:sldId id="505"/>
+            <p14:sldId id="507"/>
             <p14:sldId id="506"/>
             <p14:sldId id="497"/>
             <p14:sldId id="498"/>
@@ -273,7 +275,7 @@
           <a:p>
             <a:fld id="{B5389E1E-C654-E943-9883-792E99AD7287}" type="datetimeFigureOut">
               <a:rPr lang="en-US" smtClean="0"/>
-              <a:t>10/26/2016</a:t>
+              <a:t>10/28/2016</a:t>
             </a:fld>
             <a:endParaRPr lang="en-US"/>
           </a:p>
@@ -439,7 +441,7 @@
           <a:p>
             <a:fld id="{9920D99B-2862-464A-984E-65BFC5FC0BBC}" type="datetimeFigureOut">
               <a:rPr lang="en-US" smtClean="0"/>
-              <a:t>10/26/2016</a:t>
+              <a:t>10/28/2016</a:t>
             </a:fld>
             <a:endParaRPr lang="en-US"/>
           </a:p>
@@ -772,7 +774,327 @@
           <a:p>
             <a:fld id="{F39351FC-18D6-4741-8EEB-9FDB1F020AAC}" type="slidenum">
               <a:rPr lang="en-US" smtClean="0"/>
+              <a:t>6</a:t>
+            </a:fld>
+            <a:endParaRPr lang="en-US"/>
+          </a:p>
+        </p:txBody>
+      </p:sp>
+    </p:spTree>
+    <p:extLst>
+      <p:ext uri="{BB962C8B-B14F-4D97-AF65-F5344CB8AC3E}">
+        <p14:creationId xmlns:p14="http://schemas.microsoft.com/office/powerpoint/2010/main" val="4020850754"/>
+      </p:ext>
+    </p:extLst>
+  </p:cSld>
+  <p:clrMapOvr>
+    <a:masterClrMapping/>
+  </p:clrMapOvr>
+</p:notes>
+</file>
+
+<file path=ppt/notesSlides/notesSlide2.xml><?xml version="1.0" encoding="utf-8"?>
+<p:notes xmlns:a="http://schemas.openxmlformats.org/drawingml/2006/main" xmlns:r="http://schemas.openxmlformats.org/officeDocument/2006/relationships" xmlns:p="http://schemas.openxmlformats.org/presentationml/2006/main">
+  <p:cSld>
+    <p:spTree>
+      <p:nvGrpSpPr>
+        <p:cNvPr id="1" name=""/>
+        <p:cNvGrpSpPr/>
+        <p:nvPr/>
+      </p:nvGrpSpPr>
+      <p:grpSpPr>
+        <a:xfrm>
+          <a:off x="0" y="0"/>
+          <a:ext cx="0" cy="0"/>
+          <a:chOff x="0" y="0"/>
+          <a:chExt cx="0" cy="0"/>
+        </a:xfrm>
+      </p:grpSpPr>
+      <p:sp>
+        <p:nvSpPr>
+          <p:cNvPr id="2" name="Slide Image Placeholder 1"/>
+          <p:cNvSpPr>
+            <a:spLocks noGrp="1" noRot="1" noChangeAspect="1"/>
+          </p:cNvSpPr>
+          <p:nvPr>
+            <p:ph type="sldImg"/>
+          </p:nvPr>
+        </p:nvSpPr>
+        <p:spPr/>
+      </p:sp>
+      <p:sp>
+        <p:nvSpPr>
+          <p:cNvPr id="3" name="Notes Placeholder 2"/>
+          <p:cNvSpPr>
+            <a:spLocks noGrp="1"/>
+          </p:cNvSpPr>
+          <p:nvPr>
+            <p:ph type="body" idx="1"/>
+          </p:nvPr>
+        </p:nvSpPr>
+        <p:spPr/>
+        <p:txBody>
+          <a:bodyPr/>
+          <a:lstStyle/>
+          <a:p>
+            <a:r>
+              <a:rPr lang="en-US" dirty="0"/>
+              <a:t>There are no examples of using N1QL *directly* in</a:t>
+            </a:r>
+            <a:r>
+              <a:rPr lang="en-US" baseline="0" dirty="0"/>
+              <a:t> the Java example, but the spring-data-</a:t>
+            </a:r>
+            <a:r>
+              <a:rPr lang="en-US" baseline="0" dirty="0" err="1"/>
+              <a:t>couchbase</a:t>
+            </a:r>
+            <a:r>
+              <a:rPr lang="en-US" baseline="0" dirty="0"/>
+              <a:t> library uses N1QL under the hood</a:t>
+            </a:r>
+          </a:p>
+          <a:p>
+            <a:endParaRPr lang="en-US" baseline="0" dirty="0"/>
+          </a:p>
+          <a:p>
+            <a:r>
+              <a:rPr lang="en-US" baseline="0" dirty="0"/>
+              <a:t>You can do similar things in .NET and Node with Linq2Couchbase and ottoman</a:t>
+            </a:r>
+          </a:p>
+          <a:p>
+            <a:endParaRPr lang="en-US" baseline="0" dirty="0"/>
+          </a:p>
+          <a:p>
+            <a:r>
+              <a:rPr lang="en-US" baseline="0" dirty="0"/>
+              <a:t>Or you can (and will probably need to) define your own custom N1QL operations in Java using the N1qlQuery class</a:t>
+            </a:r>
+            <a:endParaRPr lang="en-US" dirty="0"/>
+          </a:p>
+        </p:txBody>
+      </p:sp>
+      <p:sp>
+        <p:nvSpPr>
+          <p:cNvPr id="4" name="Slide Number Placeholder 3"/>
+          <p:cNvSpPr>
+            <a:spLocks noGrp="1"/>
+          </p:cNvSpPr>
+          <p:nvPr>
+            <p:ph type="sldNum" sz="quarter" idx="10"/>
+          </p:nvPr>
+        </p:nvSpPr>
+        <p:spPr/>
+        <p:txBody>
+          <a:bodyPr/>
+          <a:lstStyle/>
+          <a:p>
+            <a:fld id="{F39351FC-18D6-4741-8EEB-9FDB1F020AAC}" type="slidenum">
+              <a:rPr lang="en-US" smtClean="0"/>
+              <a:t>7</a:t>
+            </a:fld>
+            <a:endParaRPr lang="en-US"/>
+          </a:p>
+        </p:txBody>
+      </p:sp>
+    </p:spTree>
+    <p:extLst>
+      <p:ext uri="{BB962C8B-B14F-4D97-AF65-F5344CB8AC3E}">
+        <p14:creationId xmlns:p14="http://schemas.microsoft.com/office/powerpoint/2010/main" val="1119562619"/>
+      </p:ext>
+    </p:extLst>
+  </p:cSld>
+  <p:clrMapOvr>
+    <a:masterClrMapping/>
+  </p:clrMapOvr>
+</p:notes>
+</file>
+
+<file path=ppt/notesSlides/notesSlide3.xml><?xml version="1.0" encoding="utf-8"?>
+<p:notes xmlns:a="http://schemas.openxmlformats.org/drawingml/2006/main" xmlns:r="http://schemas.openxmlformats.org/officeDocument/2006/relationships" xmlns:p="http://schemas.openxmlformats.org/presentationml/2006/main">
+  <p:cSld>
+    <p:spTree>
+      <p:nvGrpSpPr>
+        <p:cNvPr id="1" name=""/>
+        <p:cNvGrpSpPr/>
+        <p:nvPr/>
+      </p:nvGrpSpPr>
+      <p:grpSpPr>
+        <a:xfrm>
+          <a:off x="0" y="0"/>
+          <a:ext cx="0" cy="0"/>
+          <a:chOff x="0" y="0"/>
+          <a:chExt cx="0" cy="0"/>
+        </a:xfrm>
+      </p:grpSpPr>
+      <p:sp>
+        <p:nvSpPr>
+          <p:cNvPr id="2" name="Slide Image Placeholder 1"/>
+          <p:cNvSpPr>
+            <a:spLocks noGrp="1" noRot="1" noChangeAspect="1"/>
+          </p:cNvSpPr>
+          <p:nvPr>
+            <p:ph type="sldImg"/>
+          </p:nvPr>
+        </p:nvSpPr>
+        <p:spPr/>
+      </p:sp>
+      <p:sp>
+        <p:nvSpPr>
+          <p:cNvPr id="3" name="Notes Placeholder 2"/>
+          <p:cNvSpPr>
+            <a:spLocks noGrp="1"/>
+          </p:cNvSpPr>
+          <p:nvPr>
+            <p:ph type="body" idx="1"/>
+          </p:nvPr>
+        </p:nvSpPr>
+        <p:spPr/>
+        <p:txBody>
+          <a:bodyPr/>
+          <a:lstStyle/>
+          <a:p>
+            <a:r>
+              <a:rPr lang="en-US" dirty="0"/>
+              <a:t>We’re not using CAS in this example, but for</a:t>
+            </a:r>
+            <a:r>
+              <a:rPr lang="en-US" baseline="0" dirty="0"/>
+              <a:t> concurrency, </a:t>
+            </a:r>
+            <a:r>
+              <a:rPr lang="en-US" baseline="0" dirty="0" err="1"/>
+              <a:t>Couchbase</a:t>
+            </a:r>
+            <a:r>
+              <a:rPr lang="en-US" baseline="0" dirty="0"/>
+              <a:t> documents provide a CAS number when you get them out of the database.</a:t>
+            </a:r>
+          </a:p>
+          <a:p>
+            <a:r>
+              <a:rPr lang="en-US" baseline="0" dirty="0"/>
+              <a:t>You can (optionally) use that CAS number to update the document.</a:t>
+            </a:r>
+          </a:p>
+          <a:p>
+            <a:r>
+              <a:rPr lang="en-US" baseline="0" dirty="0"/>
+              <a:t>If the document has changed since you last got it, there’ll be an exception.</a:t>
+            </a:r>
+          </a:p>
+          <a:p>
+            <a:r>
+              <a:rPr lang="en-US" baseline="0" dirty="0"/>
+              <a:t>If you don’t use CAS, it will be last-write-wins</a:t>
+            </a:r>
+            <a:endParaRPr lang="en-US" dirty="0"/>
+          </a:p>
+        </p:txBody>
+      </p:sp>
+      <p:sp>
+        <p:nvSpPr>
+          <p:cNvPr id="4" name="Slide Number Placeholder 3"/>
+          <p:cNvSpPr>
+            <a:spLocks noGrp="1"/>
+          </p:cNvSpPr>
+          <p:nvPr>
+            <p:ph type="sldNum" sz="quarter" idx="10"/>
+          </p:nvPr>
+        </p:nvSpPr>
+        <p:spPr/>
+        <p:txBody>
+          <a:bodyPr/>
+          <a:lstStyle/>
+          <a:p>
+            <a:fld id="{F39351FC-18D6-4741-8EEB-9FDB1F020AAC}" type="slidenum">
+              <a:rPr lang="en-US" smtClean="0"/>
               <a:t>9</a:t>
+            </a:fld>
+            <a:endParaRPr lang="en-US"/>
+          </a:p>
+        </p:txBody>
+      </p:sp>
+    </p:spTree>
+    <p:extLst>
+      <p:ext uri="{BB962C8B-B14F-4D97-AF65-F5344CB8AC3E}">
+        <p14:creationId xmlns:p14="http://schemas.microsoft.com/office/powerpoint/2010/main" val="1203056654"/>
+      </p:ext>
+    </p:extLst>
+  </p:cSld>
+  <p:clrMapOvr>
+    <a:masterClrMapping/>
+  </p:clrMapOvr>
+</p:notes>
+</file>
+
+<file path=ppt/notesSlides/notesSlide4.xml><?xml version="1.0" encoding="utf-8"?>
+<p:notes xmlns:a="http://schemas.openxmlformats.org/drawingml/2006/main" xmlns:r="http://schemas.openxmlformats.org/officeDocument/2006/relationships" xmlns:p="http://schemas.openxmlformats.org/presentationml/2006/main">
+  <p:cSld>
+    <p:spTree>
+      <p:nvGrpSpPr>
+        <p:cNvPr id="1" name=""/>
+        <p:cNvGrpSpPr/>
+        <p:nvPr/>
+      </p:nvGrpSpPr>
+      <p:grpSpPr>
+        <a:xfrm>
+          <a:off x="0" y="0"/>
+          <a:ext cx="0" cy="0"/>
+          <a:chOff x="0" y="0"/>
+          <a:chExt cx="0" cy="0"/>
+        </a:xfrm>
+      </p:grpSpPr>
+      <p:sp>
+        <p:nvSpPr>
+          <p:cNvPr id="2" name="Slide Image Placeholder 1"/>
+          <p:cNvSpPr>
+            <a:spLocks noGrp="1" noRot="1" noChangeAspect="1"/>
+          </p:cNvSpPr>
+          <p:nvPr>
+            <p:ph type="sldImg"/>
+          </p:nvPr>
+        </p:nvSpPr>
+        <p:spPr/>
+      </p:sp>
+      <p:sp>
+        <p:nvSpPr>
+          <p:cNvPr id="3" name="Notes Placeholder 2"/>
+          <p:cNvSpPr>
+            <a:spLocks noGrp="1"/>
+          </p:cNvSpPr>
+          <p:nvPr>
+            <p:ph type="body" idx="1"/>
+          </p:nvPr>
+        </p:nvSpPr>
+        <p:spPr/>
+        <p:txBody>
+          <a:bodyPr/>
+          <a:lstStyle/>
+          <a:p>
+            <a:endParaRPr lang="en-US" dirty="0"/>
+          </a:p>
+        </p:txBody>
+      </p:sp>
+      <p:sp>
+        <p:nvSpPr>
+          <p:cNvPr id="4" name="Slide Number Placeholder 3"/>
+          <p:cNvSpPr>
+            <a:spLocks noGrp="1"/>
+          </p:cNvSpPr>
+          <p:nvPr>
+            <p:ph type="sldNum" sz="quarter" idx="10"/>
+          </p:nvPr>
+        </p:nvSpPr>
+        <p:spPr/>
+        <p:txBody>
+          <a:bodyPr/>
+          <a:lstStyle/>
+          <a:p>
+            <a:fld id="{F39351FC-18D6-4741-8EEB-9FDB1F020AAC}" type="slidenum">
+              <a:rPr lang="en-US" smtClean="0"/>
+              <a:t>10</a:t>
             </a:fld>
             <a:endParaRPr lang="en-US"/>
           </a:p>
@@ -6705,7 +7027,7 @@
           <a:p>
             <a:r>
               <a:rPr lang="en-US" dirty="0"/>
-              <a:t>Java</a:t>
+              <a:t>Error handling</a:t>
             </a:r>
           </a:p>
         </p:txBody>
@@ -6727,15 +7049,58 @@
           <a:p>
             <a:r>
               <a:rPr lang="en-US" dirty="0"/>
-              <a:t>[java example here]</a:t>
-            </a:r>
+              <a:t>.NET:</a:t>
+            </a:r>
+          </a:p>
+          <a:p>
+            <a:r>
+              <a:rPr lang="en-US" dirty="0"/>
+              <a:t>	Result objects include: Exception, Success, Message</a:t>
+            </a:r>
+          </a:p>
+          <a:p>
+            <a:endParaRPr lang="en-US" dirty="0"/>
+          </a:p>
+          <a:p>
+            <a:r>
+              <a:rPr lang="en-US" dirty="0"/>
+              <a:t>Java:</a:t>
+            </a:r>
+          </a:p>
+          <a:p>
+            <a:r>
+              <a:rPr lang="en-US" dirty="0"/>
+              <a:t>	try/catch Exception</a:t>
+            </a:r>
+          </a:p>
+          <a:p>
+            <a:endParaRPr lang="en-US" dirty="0"/>
+          </a:p>
+          <a:p>
+            <a:r>
+              <a:rPr lang="en-US" dirty="0"/>
+              <a:t>Node:</a:t>
+            </a:r>
+          </a:p>
+          <a:p>
+            <a:r>
+              <a:rPr lang="en-US" dirty="0"/>
+              <a:t>	Callbacks - </a:t>
+            </a:r>
+            <a:r>
+              <a:rPr lang="en-US" i="1" dirty="0"/>
+              <a:t>function(err, result) { }</a:t>
+            </a:r>
+          </a:p>
+          <a:p>
+            <a:endParaRPr lang="en-US" dirty="0"/>
           </a:p>
         </p:txBody>
       </p:sp>
     </p:spTree>
     <p:extLst>
       <p:ext uri="{BB962C8B-B14F-4D97-AF65-F5344CB8AC3E}">
-        <p14:creationId xmlns:p14="http://schemas.microsoft.com/office/powerpoint/2010/main" val="3978316419"/>
+        <p14:creationId xmlns:p14="http://schemas.microsoft.com/office/powerpoint/2010/main" val="4206428468"/>
       </p:ext>
     </p:extLst>
   </p:cSld>
@@ -6779,7 +7144,7 @@
           <a:p>
             <a:r>
               <a:rPr lang="en-US" dirty="0"/>
-              <a:t>.NET</a:t>
+              <a:t>Java</a:t>
             </a:r>
           </a:p>
         </p:txBody>
@@ -6832,7 +7197,7 @@
             </a:pPr>
             <a:r>
               <a:rPr lang="en-US" sz="2000" dirty="0" err="1"/>
-              <a:t>CouchbaseConfig.cs</a:t>
+              <a:t>application.properties</a:t>
             </a:r>
             <a:endParaRPr lang="en-US" sz="2000" dirty="0"/>
           </a:p>
@@ -6842,10 +7207,9 @@
               <a:buChar char="•"/>
             </a:pPr>
             <a:r>
-              <a:rPr lang="en-US" sz="2000" dirty="0" err="1"/>
-              <a:t>Web.config</a:t>
-            </a:r>
-            <a:endParaRPr lang="en-US" sz="2000" dirty="0"/>
+              <a:rPr lang="en-US" sz="2000" dirty="0"/>
+              <a:t>PersonConfig.java</a:t>
+            </a:r>
           </a:p>
           <a:p>
             <a:pPr marL="573088" lvl="1" indent="-342900">
@@ -6853,21 +7217,9 @@
               <a:buChar char="•"/>
             </a:pPr>
             <a:r>
-              <a:rPr lang="en-US" sz="2000" dirty="0" err="1"/>
-              <a:t>Person.cs</a:t>
-            </a:r>
-            <a:endParaRPr lang="en-US" sz="2000" dirty="0"/>
-          </a:p>
-          <a:p>
-            <a:pPr marL="573088" lvl="1" indent="-342900">
-              <a:buFont typeface="Arial" panose="020B0604020202020204" pitchFamily="34" charset="0"/>
-              <a:buChar char="•"/>
-            </a:pPr>
-            <a:r>
-              <a:rPr lang="en-US" sz="2000" dirty="0" err="1"/>
-              <a:t>PersonController.cs</a:t>
-            </a:r>
-            <a:endParaRPr lang="en-US" sz="2000" dirty="0"/>
+              <a:rPr lang="en-US" sz="2000" dirty="0"/>
+              <a:t>PersonController.java</a:t>
+            </a:r>
           </a:p>
           <a:p>
             <a:pPr marL="573088" lvl="1" indent="-342900">
@@ -6876,19 +7228,12 @@
             </a:pPr>
             <a:endParaRPr lang="en-US" dirty="0"/>
           </a:p>
-          <a:p>
-            <a:pPr marL="342900" indent="-342900">
-              <a:buFont typeface="Arial" panose="020B0604020202020204" pitchFamily="34" charset="0"/>
-              <a:buChar char="•"/>
-            </a:pPr>
-            <a:endParaRPr lang="en-US" dirty="0"/>
-          </a:p>
         </p:txBody>
       </p:sp>
     </p:spTree>
     <p:extLst>
       <p:ext uri="{BB962C8B-B14F-4D97-AF65-F5344CB8AC3E}">
-        <p14:creationId xmlns:p14="http://schemas.microsoft.com/office/powerpoint/2010/main" val="2942029158"/>
+        <p14:creationId xmlns:p14="http://schemas.microsoft.com/office/powerpoint/2010/main" val="3978316419"/>
       </p:ext>
     </p:extLst>
   </p:cSld>
@@ -6932,7 +7277,7 @@
           <a:p>
             <a:r>
               <a:rPr lang="en-US" dirty="0"/>
-              <a:t>Node</a:t>
+              <a:t>.NET</a:t>
             </a:r>
           </a:p>
         </p:txBody>
@@ -6975,7 +7320,7 @@
             </a:pPr>
             <a:r>
               <a:rPr lang="en-US" dirty="0"/>
-              <a:t>Files includes:</a:t>
+              <a:t>Files included:</a:t>
             </a:r>
           </a:p>
           <a:p>
@@ -6985,7 +7330,7 @@
             </a:pPr>
             <a:r>
               <a:rPr lang="en-US" sz="2000" dirty="0" err="1"/>
-              <a:t>default.json</a:t>
+              <a:t>CouchbaseConfig.cs</a:t>
             </a:r>
             <a:endParaRPr lang="en-US" sz="2000" dirty="0"/>
           </a:p>
@@ -6995,9 +7340,32 @@
               <a:buChar char="•"/>
             </a:pPr>
             <a:r>
-              <a:rPr lang="en-US" sz="2000" dirty="0"/>
-              <a:t>api.js</a:t>
-            </a:r>
+              <a:rPr lang="en-US" sz="2000" dirty="0" err="1"/>
+              <a:t>Web.config</a:t>
+            </a:r>
+            <a:endParaRPr lang="en-US" sz="2000" dirty="0"/>
+          </a:p>
+          <a:p>
+            <a:pPr marL="573088" lvl="1" indent="-342900">
+              <a:buFont typeface="Arial" panose="020B0604020202020204" pitchFamily="34" charset="0"/>
+              <a:buChar char="•"/>
+            </a:pPr>
+            <a:r>
+              <a:rPr lang="en-US" sz="2000" dirty="0" err="1"/>
+              <a:t>Person.cs</a:t>
+            </a:r>
+            <a:endParaRPr lang="en-US" sz="2000" dirty="0"/>
+          </a:p>
+          <a:p>
+            <a:pPr marL="573088" lvl="1" indent="-342900">
+              <a:buFont typeface="Arial" panose="020B0604020202020204" pitchFamily="34" charset="0"/>
+              <a:buChar char="•"/>
+            </a:pPr>
+            <a:r>
+              <a:rPr lang="en-US" sz="2000" dirty="0" err="1"/>
+              <a:t>PersonController.cs</a:t>
+            </a:r>
+            <a:endParaRPr lang="en-US" sz="2000" dirty="0"/>
           </a:p>
           <a:p>
             <a:pPr marL="573088" lvl="1" indent="-342900">
@@ -7006,12 +7374,19 @@
             </a:pPr>
             <a:endParaRPr lang="en-US" dirty="0"/>
           </a:p>
+          <a:p>
+            <a:pPr marL="342900" indent="-342900">
+              <a:buFont typeface="Arial" panose="020B0604020202020204" pitchFamily="34" charset="0"/>
+              <a:buChar char="•"/>
+            </a:pPr>
+            <a:endParaRPr lang="en-US" dirty="0"/>
+          </a:p>
         </p:txBody>
       </p:sp>
     </p:spTree>
     <p:extLst>
       <p:ext uri="{BB962C8B-B14F-4D97-AF65-F5344CB8AC3E}">
-        <p14:creationId xmlns:p14="http://schemas.microsoft.com/office/powerpoint/2010/main" val="1218663727"/>
+        <p14:creationId xmlns:p14="http://schemas.microsoft.com/office/powerpoint/2010/main" val="2942029158"/>
       </p:ext>
     </p:extLst>
   </p:cSld>
@@ -7055,14 +7430,14 @@
           <a:p>
             <a:r>
               <a:rPr lang="en-US" dirty="0"/>
-              <a:t>Angular</a:t>
+              <a:t>Node</a:t>
             </a:r>
           </a:p>
         </p:txBody>
       </p:sp>
       <p:sp>
         <p:nvSpPr>
-          <p:cNvPr id="5" name="Content Placeholder 2"/>
+          <p:cNvPr id="3" name="Content Placeholder 2"/>
           <p:cNvSpPr>
             <a:spLocks noGrp="1"/>
           </p:cNvSpPr>
@@ -7070,12 +7445,7 @@
             <p:ph idx="1"/>
           </p:nvPr>
         </p:nvSpPr>
-        <p:spPr>
-          <a:xfrm>
-            <a:off x="457200" y="685800"/>
-            <a:ext cx="8007739" cy="3394472"/>
-          </a:xfrm>
-        </p:spPr>
+        <p:spPr/>
         <p:txBody>
           <a:bodyPr/>
           <a:lstStyle/>
@@ -7103,7 +7473,7 @@
             </a:pPr>
             <a:r>
               <a:rPr lang="en-US" dirty="0"/>
-              <a:t>Files included:</a:t>
+              <a:t>Files includes:</a:t>
             </a:r>
           </a:p>
           <a:p>
@@ -7113,7 +7483,7 @@
             </a:pPr>
             <a:r>
               <a:rPr lang="en-US" sz="2000" dirty="0" err="1"/>
-              <a:t>utility.ts</a:t>
+              <a:t>default.json</a:t>
             </a:r>
             <a:endParaRPr lang="en-US" sz="2000" dirty="0"/>
           </a:p>
@@ -7123,40 +7493,8 @@
               <a:buChar char="•"/>
             </a:pPr>
             <a:r>
-              <a:rPr lang="en-US" sz="2000" dirty="0" err="1"/>
-              <a:t>item.component.ts</a:t>
-            </a:r>
-            <a:endParaRPr lang="en-US" sz="2000" dirty="0"/>
-          </a:p>
-          <a:p>
-            <a:pPr marL="573088" lvl="1" indent="-342900">
-              <a:buFont typeface="Arial" panose="020B0604020202020204" pitchFamily="34" charset="0"/>
-              <a:buChar char="•"/>
-            </a:pPr>
-            <a:r>
               <a:rPr lang="en-US" sz="2000" dirty="0"/>
-              <a:t>item.component.html</a:t>
-            </a:r>
-          </a:p>
-          <a:p>
-            <a:pPr marL="573088" lvl="1" indent="-342900">
-              <a:buFont typeface="Arial" panose="020B0604020202020204" pitchFamily="34" charset="0"/>
-              <a:buChar char="•"/>
-            </a:pPr>
-            <a:r>
-              <a:rPr lang="en-US" sz="2000" dirty="0" err="1"/>
-              <a:t>list.component.ts</a:t>
-            </a:r>
-            <a:endParaRPr lang="en-US" sz="2000" dirty="0"/>
-          </a:p>
-          <a:p>
-            <a:pPr marL="573088" lvl="1" indent="-342900">
-              <a:buFont typeface="Arial" panose="020B0604020202020204" pitchFamily="34" charset="0"/>
-              <a:buChar char="•"/>
-            </a:pPr>
-            <a:r>
-              <a:rPr lang="en-US" sz="2000" dirty="0"/>
-              <a:t>list.component.html</a:t>
+              <a:t>api.js</a:t>
             </a:r>
           </a:p>
           <a:p>
@@ -7166,19 +7504,12 @@
             </a:pPr>
             <a:endParaRPr lang="en-US" dirty="0"/>
           </a:p>
-          <a:p>
-            <a:pPr marL="342900" indent="-342900">
-              <a:buFont typeface="Arial" panose="020B0604020202020204" pitchFamily="34" charset="0"/>
-              <a:buChar char="•"/>
-            </a:pPr>
-            <a:endParaRPr lang="en-US" dirty="0"/>
-          </a:p>
         </p:txBody>
       </p:sp>
     </p:spTree>
     <p:extLst>
       <p:ext uri="{BB962C8B-B14F-4D97-AF65-F5344CB8AC3E}">
-        <p14:creationId xmlns:p14="http://schemas.microsoft.com/office/powerpoint/2010/main" val="1029063382"/>
+        <p14:creationId xmlns:p14="http://schemas.microsoft.com/office/powerpoint/2010/main" val="1218663727"/>
       </p:ext>
     </p:extLst>
   </p:cSld>
@@ -7222,6 +7553,173 @@
           <a:p>
             <a:r>
               <a:rPr lang="en-US" dirty="0"/>
+              <a:t>Angular</a:t>
+            </a:r>
+          </a:p>
+        </p:txBody>
+      </p:sp>
+      <p:sp>
+        <p:nvSpPr>
+          <p:cNvPr id="5" name="Content Placeholder 2"/>
+          <p:cNvSpPr>
+            <a:spLocks noGrp="1"/>
+          </p:cNvSpPr>
+          <p:nvPr>
+            <p:ph idx="1"/>
+          </p:nvPr>
+        </p:nvSpPr>
+        <p:spPr>
+          <a:xfrm>
+            <a:off x="457200" y="685800"/>
+            <a:ext cx="8007739" cy="3394472"/>
+          </a:xfrm>
+        </p:spPr>
+        <p:txBody>
+          <a:bodyPr/>
+          <a:lstStyle/>
+          <a:p>
+            <a:pPr marL="342900" indent="-342900">
+              <a:buFont typeface="Arial" panose="020B0604020202020204" pitchFamily="34" charset="0"/>
+              <a:buChar char="•"/>
+            </a:pPr>
+            <a:r>
+              <a:rPr lang="en-US" dirty="0"/>
+              <a:t>Look for TODOs</a:t>
+            </a:r>
+          </a:p>
+          <a:p>
+            <a:pPr marL="342900" indent="-342900">
+              <a:buFont typeface="Arial" panose="020B0604020202020204" pitchFamily="34" charset="0"/>
+              <a:buChar char="•"/>
+            </a:pPr>
+            <a:endParaRPr lang="en-US" dirty="0"/>
+          </a:p>
+          <a:p>
+            <a:pPr marL="342900" indent="-342900">
+              <a:buFont typeface="Arial" panose="020B0604020202020204" pitchFamily="34" charset="0"/>
+              <a:buChar char="•"/>
+            </a:pPr>
+            <a:r>
+              <a:rPr lang="en-US" dirty="0"/>
+              <a:t>Files included:</a:t>
+            </a:r>
+          </a:p>
+          <a:p>
+            <a:pPr marL="573088" lvl="1" indent="-342900">
+              <a:buFont typeface="Arial" panose="020B0604020202020204" pitchFamily="34" charset="0"/>
+              <a:buChar char="•"/>
+            </a:pPr>
+            <a:r>
+              <a:rPr lang="en-US" sz="2000" dirty="0" err="1"/>
+              <a:t>utility.ts</a:t>
+            </a:r>
+            <a:endParaRPr lang="en-US" sz="2000" dirty="0"/>
+          </a:p>
+          <a:p>
+            <a:pPr marL="573088" lvl="1" indent="-342900">
+              <a:buFont typeface="Arial" panose="020B0604020202020204" pitchFamily="34" charset="0"/>
+              <a:buChar char="•"/>
+            </a:pPr>
+            <a:r>
+              <a:rPr lang="en-US" sz="2000" dirty="0" err="1"/>
+              <a:t>item.component.ts</a:t>
+            </a:r>
+            <a:endParaRPr lang="en-US" sz="2000" dirty="0"/>
+          </a:p>
+          <a:p>
+            <a:pPr marL="573088" lvl="1" indent="-342900">
+              <a:buFont typeface="Arial" panose="020B0604020202020204" pitchFamily="34" charset="0"/>
+              <a:buChar char="•"/>
+            </a:pPr>
+            <a:r>
+              <a:rPr lang="en-US" sz="2000" dirty="0"/>
+              <a:t>item.component.html</a:t>
+            </a:r>
+          </a:p>
+          <a:p>
+            <a:pPr marL="573088" lvl="1" indent="-342900">
+              <a:buFont typeface="Arial" panose="020B0604020202020204" pitchFamily="34" charset="0"/>
+              <a:buChar char="•"/>
+            </a:pPr>
+            <a:r>
+              <a:rPr lang="en-US" sz="2000" dirty="0" err="1"/>
+              <a:t>list.component.ts</a:t>
+            </a:r>
+            <a:endParaRPr lang="en-US" sz="2000" dirty="0"/>
+          </a:p>
+          <a:p>
+            <a:pPr marL="573088" lvl="1" indent="-342900">
+              <a:buFont typeface="Arial" panose="020B0604020202020204" pitchFamily="34" charset="0"/>
+              <a:buChar char="•"/>
+            </a:pPr>
+            <a:r>
+              <a:rPr lang="en-US" sz="2000" dirty="0"/>
+              <a:t>list.component.html</a:t>
+            </a:r>
+          </a:p>
+          <a:p>
+            <a:pPr marL="573088" lvl="1" indent="-342900">
+              <a:buFont typeface="Arial" panose="020B0604020202020204" pitchFamily="34" charset="0"/>
+              <a:buChar char="•"/>
+            </a:pPr>
+            <a:endParaRPr lang="en-US" dirty="0"/>
+          </a:p>
+          <a:p>
+            <a:pPr marL="342900" indent="-342900">
+              <a:buFont typeface="Arial" panose="020B0604020202020204" pitchFamily="34" charset="0"/>
+              <a:buChar char="•"/>
+            </a:pPr>
+            <a:endParaRPr lang="en-US" dirty="0"/>
+          </a:p>
+        </p:txBody>
+      </p:sp>
+    </p:spTree>
+    <p:extLst>
+      <p:ext uri="{BB962C8B-B14F-4D97-AF65-F5344CB8AC3E}">
+        <p14:creationId xmlns:p14="http://schemas.microsoft.com/office/powerpoint/2010/main" val="1029063382"/>
+      </p:ext>
+    </p:extLst>
+  </p:cSld>
+  <p:clrMapOvr>
+    <a:masterClrMapping/>
+  </p:clrMapOvr>
+</p:sld>
+</file>
+
+<file path=ppt/slides/slide15.xml><?xml version="1.0" encoding="utf-8"?>
+<p:sld xmlns:a="http://schemas.openxmlformats.org/drawingml/2006/main" xmlns:r="http://schemas.openxmlformats.org/officeDocument/2006/relationships" xmlns:p="http://schemas.openxmlformats.org/presentationml/2006/main">
+  <p:cSld>
+    <p:spTree>
+      <p:nvGrpSpPr>
+        <p:cNvPr id="1" name=""/>
+        <p:cNvGrpSpPr/>
+        <p:nvPr/>
+      </p:nvGrpSpPr>
+      <p:grpSpPr>
+        <a:xfrm>
+          <a:off x="0" y="0"/>
+          <a:ext cx="0" cy="0"/>
+          <a:chOff x="0" y="0"/>
+          <a:chExt cx="0" cy="0"/>
+        </a:xfrm>
+      </p:grpSpPr>
+      <p:sp>
+        <p:nvSpPr>
+          <p:cNvPr id="2" name="Title 1"/>
+          <p:cNvSpPr>
+            <a:spLocks noGrp="1"/>
+          </p:cNvSpPr>
+          <p:nvPr>
+            <p:ph type="title"/>
+          </p:nvPr>
+        </p:nvSpPr>
+        <p:spPr/>
+        <p:txBody>
+          <a:bodyPr/>
+          <a:lstStyle/>
+          <a:p>
+            <a:r>
+              <a:rPr lang="en-US" dirty="0"/>
               <a:t>How to execute</a:t>
             </a:r>
           </a:p>
@@ -7343,7 +7841,7 @@
 </p:sld>
 </file>
 
-<file path=ppt/slides/slide15.xml><?xml version="1.0" encoding="utf-8"?>
+<file path=ppt/slides/slide16.xml><?xml version="1.0" encoding="utf-8"?>
 <p:sld xmlns:a="http://schemas.openxmlformats.org/drawingml/2006/main" xmlns:r="http://schemas.openxmlformats.org/officeDocument/2006/relationships" xmlns:p="http://schemas.openxmlformats.org/presentationml/2006/main">
   <p:cSld>
     <p:spTree>
@@ -7947,7 +8445,7 @@
             </a:pPr>
             <a:r>
               <a:rPr lang="en-US" dirty="0"/>
-              <a:t>Checkout the “lab” branch from </a:t>
+              <a:t>Checkout the code from </a:t>
             </a:r>
             <a:r>
               <a:rPr lang="en-US" dirty="0" err="1"/>
@@ -8164,10 +8662,39 @@
             <p:ph idx="1"/>
           </p:nvPr>
         </p:nvSpPr>
-        <p:spPr/>
+        <p:spPr>
+          <a:xfrm>
+            <a:off x="457200" y="685800"/>
+            <a:ext cx="8433303" cy="3394472"/>
+          </a:xfrm>
+        </p:spPr>
         <p:txBody>
           <a:bodyPr/>
           <a:lstStyle/>
+          <a:p>
+            <a:r>
+              <a:rPr lang="en-US" sz="1600" dirty="0">
+                <a:hlinkClick r:id="rId3"/>
+              </a:rPr>
+              <a:t>http://developer.couchbase.com/documentation/server/4.5/sdk/</a:t>
+            </a:r>
+            <a:r>
+              <a:rPr lang="en-US" sz="1600" b="1" dirty="0">
+                <a:hlinkClick r:id="rId3"/>
+              </a:rPr>
+              <a:t>dotnet</a:t>
+            </a:r>
+            <a:r>
+              <a:rPr lang="en-US" sz="1600" dirty="0">
+                <a:hlinkClick r:id="rId3"/>
+              </a:rPr>
+              <a:t>/async-programming.html</a:t>
+            </a:r>
+            <a:endParaRPr lang="en-US" sz="1600" dirty="0"/>
+          </a:p>
+          <a:p>
+            <a:endParaRPr lang="en-US" dirty="0"/>
+          </a:p>
           <a:p>
             <a:r>
               <a:rPr lang="en-US" dirty="0"/>
@@ -8293,6 +8820,30 @@
           <a:lstStyle/>
           <a:p>
             <a:r>
+              <a:rPr lang="en-US" sz="1400" dirty="0">
+                <a:hlinkClick r:id="rId3"/>
+              </a:rPr>
+              <a:t>http://developer.couchbase.com/documentation/server/4.5/sdk/</a:t>
+            </a:r>
+            <a:r>
+              <a:rPr lang="en-US" sz="1400" b="1" dirty="0">
+                <a:hlinkClick r:id="rId3"/>
+              </a:rPr>
+              <a:t>dotnet</a:t>
+            </a:r>
+            <a:r>
+              <a:rPr lang="en-US" sz="1400" dirty="0">
+                <a:hlinkClick r:id="rId3"/>
+              </a:rPr>
+              <a:t>/n1ql-queries-with-sdk.html</a:t>
+            </a:r>
+            <a:endParaRPr lang="en-US" sz="1400" dirty="0"/>
+          </a:p>
+          <a:p>
+            <a:endParaRPr lang="en-US" dirty="0"/>
+          </a:p>
+          <a:p>
+            <a:r>
               <a:rPr lang="en-US" dirty="0"/>
               <a:t>.NET:</a:t>
             </a:r>
@@ -8330,6 +8881,12 @@
             <a:r>
               <a:rPr lang="en-US" dirty="0"/>
               <a:t>Java:</a:t>
+            </a:r>
+          </a:p>
+          <a:p>
+            <a:r>
+              <a:rPr lang="en-US" dirty="0"/>
+              <a:t>	N1qlQuery</a:t>
             </a:r>
           </a:p>
         </p:txBody>
@@ -8396,10 +8953,27 @@
             <p:ph idx="1"/>
           </p:nvPr>
         </p:nvSpPr>
-        <p:spPr/>
+        <p:spPr>
+          <a:xfrm>
+            <a:off x="457200" y="685800"/>
+            <a:ext cx="8451410" cy="3394472"/>
+          </a:xfrm>
+        </p:spPr>
         <p:txBody>
           <a:bodyPr/>
           <a:lstStyle/>
+          <a:p>
+            <a:r>
+              <a:rPr lang="en-US" sz="1400" dirty="0">
+                <a:hlinkClick r:id="rId2"/>
+              </a:rPr>
+              <a:t>http://developer.couchbase.com/documentation/server/4.5/architecture/querying-data-with-n1ql.html</a:t>
+            </a:r>
+            <a:endParaRPr lang="en-US" sz="1400" dirty="0"/>
+          </a:p>
+          <a:p>
+            <a:endParaRPr lang="en-US" dirty="0"/>
+          </a:p>
           <a:p>
             <a:r>
               <a:rPr lang="en-US" dirty="0" err="1"/>
@@ -8494,7 +9068,7 @@
           <a:p>
             <a:r>
               <a:rPr lang="en-US" dirty="0"/>
-              <a:t>Error handling</a:t>
+              <a:t>Check And Set (CAS)</a:t>
             </a:r>
           </a:p>
         </p:txBody>
@@ -8509,12 +9083,41 @@
             <p:ph idx="1"/>
           </p:nvPr>
         </p:nvSpPr>
-        <p:spPr/>
+        <p:spPr>
+          <a:xfrm>
+            <a:off x="457200" y="685800"/>
+            <a:ext cx="8478570" cy="3394472"/>
+          </a:xfrm>
+        </p:spPr>
         <p:txBody>
           <a:bodyPr/>
           <a:lstStyle/>
           <a:p>
             <a:r>
+              <a:rPr lang="en-US" sz="1600" dirty="0">
+                <a:hlinkClick r:id="rId3"/>
+              </a:rPr>
+              <a:t>http://developer.couchbase.com/documentation/server/4.5/sdk/</a:t>
+            </a:r>
+            <a:r>
+              <a:rPr lang="en-US" sz="1600" b="1" dirty="0">
+                <a:hlinkClick r:id="rId3"/>
+              </a:rPr>
+              <a:t>dotnet</a:t>
+            </a:r>
+            <a:r>
+              <a:rPr lang="en-US" sz="1600" dirty="0">
+                <a:hlinkClick r:id="rId3"/>
+              </a:rPr>
+              <a:t>/document-operations.html</a:t>
+            </a:r>
+            <a:endParaRPr lang="en-US" sz="1600" dirty="0"/>
+          </a:p>
+          <a:p>
+            <a:endParaRPr lang="en-US" dirty="0"/>
+          </a:p>
+          <a:p>
+            <a:r>
               <a:rPr lang="en-US" dirty="0"/>
               <a:t>.NET:</a:t>
             </a:r>
@@ -8522,7 +9125,52 @@
           <a:p>
             <a:r>
               <a:rPr lang="en-US" dirty="0"/>
-              <a:t>	Result objects include: Exception, Success, Message</a:t>
+              <a:t>	</a:t>
+            </a:r>
+            <a:r>
+              <a:rPr lang="en-US" dirty="0">
+                <a:latin typeface="Consolas" panose="020B0609020204030204" pitchFamily="49" charset="0"/>
+              </a:rPr>
+              <a:t>new Document&lt;T&gt; { Cas = … }</a:t>
+            </a:r>
+          </a:p>
+          <a:p>
+            <a:endParaRPr lang="en-US" dirty="0"/>
+          </a:p>
+          <a:p>
+            <a:r>
+              <a:rPr lang="en-US" dirty="0"/>
+              <a:t>Node:</a:t>
+            </a:r>
+          </a:p>
+          <a:p>
+            <a:r>
+              <a:rPr lang="en-US" dirty="0"/>
+              <a:t>	</a:t>
+            </a:r>
+            <a:r>
+              <a:rPr lang="en-US" dirty="0" err="1">
+                <a:latin typeface="Consolas" panose="020B0609020204030204" pitchFamily="49" charset="0"/>
+              </a:rPr>
+              <a:t>bucket.replace</a:t>
+            </a:r>
+            <a:r>
+              <a:rPr lang="en-US" dirty="0">
+                <a:latin typeface="Consolas" panose="020B0609020204030204" pitchFamily="49" charset="0"/>
+              </a:rPr>
+              <a:t>(‘key’, { document}, {</a:t>
+            </a:r>
+            <a:r>
+              <a:rPr lang="en-US" dirty="0" err="1">
+                <a:latin typeface="Consolas" panose="020B0609020204030204" pitchFamily="49" charset="0"/>
+              </a:rPr>
+              <a:t>cas</a:t>
+            </a:r>
+            <a:r>
+              <a:rPr lang="en-US" dirty="0">
+                <a:latin typeface="Consolas" panose="020B0609020204030204" pitchFamily="49" charset="0"/>
+              </a:rPr>
+              <a:t>: … }, … )</a:t>
             </a:r>
           </a:p>
           <a:p>
@@ -8535,36 +9183,25 @@
             </a:r>
           </a:p>
           <a:p>
-            <a:endParaRPr lang="en-US" dirty="0"/>
-          </a:p>
-          <a:p>
-            <a:endParaRPr lang="en-US" dirty="0"/>
-          </a:p>
-          <a:p>
             <a:r>
               <a:rPr lang="en-US" dirty="0"/>
-              <a:t>Node:</a:t>
-            </a:r>
-          </a:p>
-          <a:p>
+              <a:t>	@Version attribute (spring-data-</a:t>
+            </a:r>
+            <a:r>
+              <a:rPr lang="en-US" dirty="0" err="1"/>
+              <a:t>couchbase</a:t>
+            </a:r>
             <a:r>
               <a:rPr lang="en-US" dirty="0"/>
-              <a:t>	Callbacks - </a:t>
-            </a:r>
-            <a:r>
-              <a:rPr lang="en-US" i="1" dirty="0"/>
-              <a:t>function(err, result) { }</a:t>
-            </a:r>
-          </a:p>
-          <a:p>
-            <a:endParaRPr lang="en-US" dirty="0"/>
+              <a:t>)</a:t>
+            </a:r>
           </a:p>
         </p:txBody>
       </p:sp>
     </p:spTree>
     <p:extLst>
       <p:ext uri="{BB962C8B-B14F-4D97-AF65-F5344CB8AC3E}">
-        <p14:creationId xmlns:p14="http://schemas.microsoft.com/office/powerpoint/2010/main" val="4206428468"/>
+        <p14:creationId xmlns:p14="http://schemas.microsoft.com/office/powerpoint/2010/main" val="1315104695"/>
       </p:ext>
     </p:extLst>
   </p:cSld>

</xml_diff>

<commit_message>
some last minute tweaks for Connect
</commit_message>
<xml_diff>
--- a/connect2016/developer/03/03.pptx
+++ b/connect2016/developer/03/03.pptx
@@ -275,7 +275,7 @@
           <a:p>
             <a:fld id="{B5389E1E-C654-E943-9883-792E99AD7287}" type="datetimeFigureOut">
               <a:rPr lang="en-US" smtClean="0"/>
-              <a:t>10/28/2016</a:t>
+              <a:t>11/6/2016</a:t>
             </a:fld>
             <a:endParaRPr lang="en-US"/>
           </a:p>
@@ -441,7 +441,7 @@
           <a:p>
             <a:fld id="{9920D99B-2862-464A-984E-65BFC5FC0BBC}" type="datetimeFigureOut">
               <a:rPr lang="en-US" smtClean="0"/>
-              <a:t>10/28/2016</a:t>
+              <a:t>11/6/2016</a:t>
             </a:fld>
             <a:endParaRPr lang="en-US"/>
           </a:p>
@@ -1104,6 +1104,124 @@
     <p:extLst>
       <p:ext uri="{BB962C8B-B14F-4D97-AF65-F5344CB8AC3E}">
         <p14:creationId xmlns:p14="http://schemas.microsoft.com/office/powerpoint/2010/main" val="4041048519"/>
+      </p:ext>
+    </p:extLst>
+  </p:cSld>
+  <p:clrMapOvr>
+    <a:masterClrMapping/>
+  </p:clrMapOvr>
+</p:notes>
+</file>
+
+<file path=ppt/notesSlides/notesSlide5.xml><?xml version="1.0" encoding="utf-8"?>
+<p:notes xmlns:a="http://schemas.openxmlformats.org/drawingml/2006/main" xmlns:r="http://schemas.openxmlformats.org/officeDocument/2006/relationships" xmlns:p="http://schemas.openxmlformats.org/presentationml/2006/main">
+  <p:cSld>
+    <p:spTree>
+      <p:nvGrpSpPr>
+        <p:cNvPr id="1" name=""/>
+        <p:cNvGrpSpPr/>
+        <p:nvPr/>
+      </p:nvGrpSpPr>
+      <p:grpSpPr>
+        <a:xfrm>
+          <a:off x="0" y="0"/>
+          <a:ext cx="0" cy="0"/>
+          <a:chOff x="0" y="0"/>
+          <a:chExt cx="0" cy="0"/>
+        </a:xfrm>
+      </p:grpSpPr>
+      <p:sp>
+        <p:nvSpPr>
+          <p:cNvPr id="2" name="Slide Image Placeholder 1"/>
+          <p:cNvSpPr>
+            <a:spLocks noGrp="1" noRot="1" noChangeAspect="1"/>
+          </p:cNvSpPr>
+          <p:nvPr>
+            <p:ph type="sldImg"/>
+          </p:nvPr>
+        </p:nvSpPr>
+        <p:spPr/>
+      </p:sp>
+      <p:sp>
+        <p:nvSpPr>
+          <p:cNvPr id="3" name="Notes Placeholder 2"/>
+          <p:cNvSpPr>
+            <a:spLocks noGrp="1"/>
+          </p:cNvSpPr>
+          <p:nvPr>
+            <p:ph type="body" idx="1"/>
+          </p:nvPr>
+        </p:nvSpPr>
+        <p:spPr/>
+        <p:txBody>
+          <a:bodyPr/>
+          <a:lstStyle/>
+          <a:p>
+            <a:r>
+              <a:rPr lang="en-US" dirty="0"/>
+              <a:t>We</a:t>
+            </a:r>
+            <a:r>
+              <a:rPr lang="en-US" baseline="0" dirty="0"/>
+              <a:t> started this workshop a while ago, but we haven’t been keeping up with Angular, so you might get an error message if you don’t use 1.0.0-beta.10</a:t>
+            </a:r>
+          </a:p>
+          <a:p>
+            <a:r>
+              <a:rPr lang="en-US" baseline="0" dirty="0"/>
+              <a:t>Then kick off the angular server with </a:t>
+            </a:r>
+            <a:r>
+              <a:rPr lang="en-US" baseline="0"/>
+              <a:t>ng serve</a:t>
+            </a:r>
+          </a:p>
+          <a:p>
+            <a:endParaRPr lang="en-US" baseline="0" dirty="0"/>
+          </a:p>
+          <a:p>
+            <a:endParaRPr lang="en-US" baseline="0" dirty="0"/>
+          </a:p>
+          <a:p>
+            <a:r>
+              <a:rPr lang="en-US" baseline="0" dirty="0"/>
+              <a:t>For node, it’s using gulp, so if you don’t have gulp installed, you can install it with </a:t>
+            </a:r>
+            <a:r>
+              <a:rPr lang="en-US" baseline="0" dirty="0" err="1"/>
+              <a:t>npm</a:t>
+            </a:r>
+            <a:endParaRPr lang="en-US" baseline="0" dirty="0"/>
+          </a:p>
+        </p:txBody>
+      </p:sp>
+      <p:sp>
+        <p:nvSpPr>
+          <p:cNvPr id="4" name="Slide Number Placeholder 3"/>
+          <p:cNvSpPr>
+            <a:spLocks noGrp="1"/>
+          </p:cNvSpPr>
+          <p:nvPr>
+            <p:ph type="sldNum" sz="quarter" idx="10"/>
+          </p:nvPr>
+        </p:nvSpPr>
+        <p:spPr/>
+        <p:txBody>
+          <a:bodyPr/>
+          <a:lstStyle/>
+          <a:p>
+            <a:fld id="{F39351FC-18D6-4741-8EEB-9FDB1F020AAC}" type="slidenum">
+              <a:rPr lang="en-US" smtClean="0"/>
+              <a:t>15</a:t>
+            </a:fld>
+            <a:endParaRPr lang="en-US"/>
+          </a:p>
+        </p:txBody>
+      </p:sp>
+    </p:spTree>
+    <p:extLst>
+      <p:ext uri="{BB962C8B-B14F-4D97-AF65-F5344CB8AC3E}">
+        <p14:creationId xmlns:p14="http://schemas.microsoft.com/office/powerpoint/2010/main" val="1659110175"/>
       </p:ext>
     </p:extLst>
   </p:cSld>
@@ -7744,6 +7862,32 @@
               <a:rPr lang="en-US" dirty="0"/>
               <a:t>Execute Angular 2: </a:t>
             </a:r>
+          </a:p>
+          <a:p>
+            <a:pPr marL="342900" indent="-342900">
+              <a:buFont typeface="Arial" panose="020B0604020202020204" pitchFamily="34" charset="0"/>
+              <a:buChar char="•"/>
+            </a:pPr>
+            <a:r>
+              <a:rPr lang="en-US" dirty="0" err="1">
+                <a:latin typeface="Courier New" panose="02070309020205020404" pitchFamily="49" charset="0"/>
+                <a:cs typeface="Courier New" panose="02070309020205020404" pitchFamily="49" charset="0"/>
+              </a:rPr>
+              <a:t>npm</a:t>
+            </a:r>
+            <a:r>
+              <a:rPr lang="en-US" dirty="0">
+                <a:latin typeface="Courier New" panose="02070309020205020404" pitchFamily="49" charset="0"/>
+                <a:cs typeface="Courier New" panose="02070309020205020404" pitchFamily="49" charset="0"/>
+              </a:rPr>
+              <a:t> install angular-cli@1.0.0-beta.10</a:t>
+            </a:r>
+          </a:p>
+          <a:p>
+            <a:pPr marL="342900" indent="-342900">
+              <a:buFont typeface="Arial" panose="020B0604020202020204" pitchFamily="34" charset="0"/>
+              <a:buChar char="•"/>
+            </a:pPr>
             <a:r>
               <a:rPr lang="en-US" dirty="0">
                 <a:latin typeface="Courier New" panose="02070309020205020404" pitchFamily="49" charset="0"/>
@@ -7823,7 +7967,27 @@
                 <a:latin typeface="Courier New" panose="02070309020205020404" pitchFamily="49" charset="0"/>
                 <a:cs typeface="Courier New" panose="02070309020205020404" pitchFamily="49" charset="0"/>
               </a:rPr>
-              <a:t>node app.js</a:t>
+              <a:t>node app.js (</a:t>
+            </a:r>
+            <a:r>
+              <a:rPr lang="en-US" dirty="0">
+                <a:cs typeface="Courier New" panose="02070309020205020404" pitchFamily="49" charset="0"/>
+              </a:rPr>
+              <a:t>may need </a:t>
+            </a:r>
+            <a:r>
+              <a:rPr lang="en-US" dirty="0" err="1">
+                <a:latin typeface="Courier New" panose="02070309020205020404" pitchFamily="49" charset="0"/>
+                <a:cs typeface="Courier New" panose="02070309020205020404" pitchFamily="49" charset="0"/>
+              </a:rPr>
+              <a:t>npm</a:t>
+            </a:r>
+            <a:r>
+              <a:rPr lang="en-US" dirty="0">
+                <a:latin typeface="Courier New" panose="02070309020205020404" pitchFamily="49" charset="0"/>
+                <a:cs typeface="Courier New" panose="02070309020205020404" pitchFamily="49" charset="0"/>
+              </a:rPr>
+              <a:t> install gulp –g)</a:t>
             </a:r>
           </a:p>
         </p:txBody>

</xml_diff>